<commit_message>
Recording and updated slides
</commit_message>
<xml_diff>
--- a/term2/projects/CarSalesPrice/Term3-Project-ML1-Dhaval.pptx
+++ b/term2/projects/CarSalesPrice/Term3-Project-ML1-Dhaval.pptx
@@ -7,12 +7,14 @@
   <p:sldIdLst>
     <p:sldId id="256" r:id="rId2"/>
     <p:sldId id="257" r:id="rId3"/>
-    <p:sldId id="258" r:id="rId4"/>
-    <p:sldId id="260" r:id="rId5"/>
-    <p:sldId id="261" r:id="rId6"/>
-    <p:sldId id="262" r:id="rId7"/>
-    <p:sldId id="263" r:id="rId8"/>
-    <p:sldId id="264" r:id="rId9"/>
+    <p:sldId id="265" r:id="rId4"/>
+    <p:sldId id="266" r:id="rId5"/>
+    <p:sldId id="258" r:id="rId6"/>
+    <p:sldId id="260" r:id="rId7"/>
+    <p:sldId id="261" r:id="rId8"/>
+    <p:sldId id="262" r:id="rId9"/>
+    <p:sldId id="263" r:id="rId10"/>
+    <p:sldId id="264" r:id="rId11"/>
   </p:sldIdLst>
   <p:sldSz cx="12192000" cy="6858000"/>
   <p:notesSz cx="6858000" cy="9144000"/>
@@ -111,6 +113,11 @@
       </a:defRPr>
     </a:lvl9pPr>
   </p:defaultTextStyle>
+  <p:extLst>
+    <p:ext uri="{EFAFB233-063F-42B5-8137-9DF3F51BA10A}">
+      <p15:sldGuideLst xmlns:p15="http://schemas.microsoft.com/office/powerpoint/2012/main"/>
+    </p:ext>
+  </p:extLst>
 </p:presentation>
 </file>
 
@@ -13354,6 +13361,267 @@
   <p:clrMapOvr>
     <a:masterClrMapping/>
   </p:clrMapOvr>
+  <p:timing>
+    <p:tnLst>
+      <p:par>
+        <p:cTn id="1" dur="indefinite" restart="never" nodeType="tmRoot"/>
+      </p:par>
+    </p:tnLst>
+  </p:timing>
+</p:sld>
+</file>
+
+<file path=ppt/slides/slide10.xml><?xml version="1.0" encoding="utf-8"?>
+<p:sld xmlns:a="http://schemas.openxmlformats.org/drawingml/2006/main" xmlns:r="http://schemas.openxmlformats.org/officeDocument/2006/relationships" xmlns:p="http://schemas.openxmlformats.org/presentationml/2006/main">
+  <p:cSld>
+    <p:spTree>
+      <p:nvGrpSpPr>
+        <p:cNvPr id="1" name=""/>
+        <p:cNvGrpSpPr/>
+        <p:nvPr/>
+      </p:nvGrpSpPr>
+      <p:grpSpPr>
+        <a:xfrm>
+          <a:off x="0" y="0"/>
+          <a:ext cx="0" cy="0"/>
+          <a:chOff x="0" y="0"/>
+          <a:chExt cx="0" cy="0"/>
+        </a:xfrm>
+      </p:grpSpPr>
+      <p:sp>
+        <p:nvSpPr>
+          <p:cNvPr id="2" name="Title 1"/>
+          <p:cNvSpPr>
+            <a:spLocks noGrp="1"/>
+          </p:cNvSpPr>
+          <p:nvPr>
+            <p:ph type="title"/>
+          </p:nvPr>
+        </p:nvSpPr>
+        <p:spPr/>
+        <p:txBody>
+          <a:bodyPr/>
+          <a:lstStyle/>
+          <a:p>
+            <a:r>
+              <a:rPr lang="en-US" dirty="0" smtClean="0"/>
+              <a:t>Conclusion</a:t>
+            </a:r>
+            <a:endParaRPr lang="en-US" dirty="0"/>
+          </a:p>
+        </p:txBody>
+      </p:sp>
+      <p:sp>
+        <p:nvSpPr>
+          <p:cNvPr id="3" name="Content Placeholder 2"/>
+          <p:cNvSpPr>
+            <a:spLocks noGrp="1"/>
+          </p:cNvSpPr>
+          <p:nvPr>
+            <p:ph idx="1"/>
+          </p:nvPr>
+        </p:nvSpPr>
+        <p:spPr>
+          <a:xfrm>
+            <a:off x="447869" y="2286000"/>
+            <a:ext cx="11252719" cy="4422710"/>
+          </a:xfrm>
+        </p:spPr>
+        <p:txBody>
+          <a:bodyPr>
+            <a:normAutofit lnSpcReduction="10000"/>
+          </a:bodyPr>
+          <a:lstStyle/>
+          <a:p>
+            <a:r>
+              <a:rPr lang="en-US" dirty="0" smtClean="0"/>
+              <a:t>Based on evaluated Models</a:t>
+            </a:r>
+          </a:p>
+          <a:p>
+            <a:pPr lvl="1"/>
+            <a:r>
+              <a:rPr lang="en-US" dirty="0" smtClean="0"/>
+              <a:t>One option is to use dual model approach </a:t>
+            </a:r>
+          </a:p>
+          <a:p>
+            <a:pPr lvl="2"/>
+            <a:r>
+              <a:rPr lang="en-US" dirty="0" smtClean="0"/>
+              <a:t>For lower priced cars we can use the Polynomial Regression Model for prediction.</a:t>
+            </a:r>
+          </a:p>
+          <a:p>
+            <a:pPr lvl="2"/>
+            <a:r>
+              <a:rPr lang="en-US" dirty="0" smtClean="0"/>
+              <a:t>For High and Extremely high priced cars use </a:t>
+            </a:r>
+            <a:r>
+              <a:rPr lang="en-US" dirty="0" err="1"/>
+              <a:t>GradientBoostingRegressor</a:t>
+            </a:r>
+            <a:r>
+              <a:rPr lang="en-US" dirty="0" smtClean="0"/>
+              <a:t> for prediction.</a:t>
+            </a:r>
+          </a:p>
+          <a:p>
+            <a:pPr lvl="1"/>
+            <a:r>
+              <a:rPr lang="en-US" dirty="0" smtClean="0"/>
+              <a:t>Other option is single model approach.</a:t>
+            </a:r>
+          </a:p>
+          <a:p>
+            <a:pPr lvl="2"/>
+            <a:r>
+              <a:rPr lang="en-US" dirty="0" smtClean="0"/>
+              <a:t>Over all Polynomial is less complex model compared to </a:t>
+            </a:r>
+            <a:r>
+              <a:rPr lang="en-US" dirty="0" err="1" smtClean="0"/>
+              <a:t>GradientBoostingRegressor</a:t>
+            </a:r>
+            <a:r>
+              <a:rPr lang="en-US" dirty="0" smtClean="0"/>
+              <a:t>.</a:t>
+            </a:r>
+            <a:endParaRPr lang="en-US" dirty="0" smtClean="0"/>
+          </a:p>
+          <a:p>
+            <a:pPr lvl="2"/>
+            <a:r>
+              <a:rPr lang="en-US" dirty="0" smtClean="0"/>
+              <a:t>Would be simpler to </a:t>
+            </a:r>
+            <a:r>
+              <a:rPr lang="en-US" dirty="0" smtClean="0"/>
+              <a:t>explain</a:t>
+            </a:r>
+            <a:r>
+              <a:rPr lang="en-US" dirty="0"/>
+              <a:t>.</a:t>
+            </a:r>
+            <a:endParaRPr lang="en-US" dirty="0" smtClean="0"/>
+          </a:p>
+          <a:p>
+            <a:pPr lvl="2"/>
+            <a:r>
+              <a:rPr lang="en-US" dirty="0" smtClean="0"/>
+              <a:t>Has comparable results to the </a:t>
+            </a:r>
+            <a:r>
+              <a:rPr lang="en-US" dirty="0" err="1" smtClean="0"/>
+              <a:t>GradientBoostingRegressor</a:t>
+            </a:r>
+            <a:r>
+              <a:rPr lang="en-US" dirty="0"/>
+              <a:t> </a:t>
+            </a:r>
+            <a:r>
+              <a:rPr lang="en-US" dirty="0" smtClean="0"/>
+              <a:t>thus we could use Polynomial for single model approach.</a:t>
+            </a:r>
+          </a:p>
+          <a:p>
+            <a:pPr lvl="1"/>
+            <a:r>
+              <a:rPr lang="en-US" dirty="0" smtClean="0"/>
+              <a:t>As the RMSE is in the range of </a:t>
+            </a:r>
+            <a:r>
+              <a:rPr lang="en-US" dirty="0" smtClean="0"/>
+              <a:t>6000, </a:t>
+            </a:r>
+            <a:r>
+              <a:rPr lang="en-US" dirty="0" smtClean="0"/>
+              <a:t>we should provide the prediction price range </a:t>
+            </a:r>
+            <a:r>
+              <a:rPr lang="en-US" dirty="0" smtClean="0"/>
+              <a:t>as follows (as higher </a:t>
+            </a:r>
+            <a:r>
+              <a:rPr lang="en-US" dirty="0" smtClean="0"/>
+              <a:t>variance is for highly priced car </a:t>
+            </a:r>
+            <a:r>
+              <a:rPr lang="en-US" dirty="0" smtClean="0"/>
+              <a:t>category) </a:t>
+            </a:r>
+            <a:endParaRPr lang="en-US" dirty="0" smtClean="0"/>
+          </a:p>
+          <a:p>
+            <a:pPr lvl="2"/>
+            <a:r>
+              <a:rPr lang="en-US" dirty="0" smtClean="0"/>
+              <a:t>Range for price &lt; 10k </a:t>
+            </a:r>
+            <a:r>
+              <a:rPr lang="en-US" dirty="0" smtClean="0">
+                <a:sym typeface="Wingdings" panose="05000000000000000000" pitchFamily="2" charset="2"/>
+              </a:rPr>
+              <a:t> ± 1000</a:t>
+            </a:r>
+          </a:p>
+          <a:p>
+            <a:pPr lvl="2"/>
+            <a:r>
+              <a:rPr lang="en-US" dirty="0" smtClean="0">
+                <a:sym typeface="Wingdings" panose="05000000000000000000" pitchFamily="2" charset="2"/>
+              </a:rPr>
+              <a:t>Range for price between 10K and 50K  </a:t>
+            </a:r>
+            <a:r>
+              <a:rPr lang="en-US" dirty="0">
+                <a:sym typeface="Wingdings" panose="05000000000000000000" pitchFamily="2" charset="2"/>
+              </a:rPr>
+              <a:t>± </a:t>
+            </a:r>
+            <a:r>
+              <a:rPr lang="en-US" dirty="0" smtClean="0">
+                <a:sym typeface="Wingdings" panose="05000000000000000000" pitchFamily="2" charset="2"/>
+              </a:rPr>
+              <a:t>4000</a:t>
+            </a:r>
+          </a:p>
+          <a:p>
+            <a:pPr lvl="2"/>
+            <a:r>
+              <a:rPr lang="en-US" dirty="0" smtClean="0">
+                <a:sym typeface="Wingdings" panose="05000000000000000000" pitchFamily="2" charset="2"/>
+              </a:rPr>
+              <a:t>Range for price &gt; 50K  ± </a:t>
+            </a:r>
+            <a:r>
+              <a:rPr lang="en-US" dirty="0" smtClean="0">
+                <a:sym typeface="Wingdings" panose="05000000000000000000" pitchFamily="2" charset="2"/>
+              </a:rPr>
+              <a:t>6000</a:t>
+            </a:r>
+            <a:endParaRPr lang="en-US" dirty="0" smtClean="0"/>
+          </a:p>
+        </p:txBody>
+      </p:sp>
+    </p:spTree>
+    <p:extLst>
+      <p:ext uri="{BB962C8B-B14F-4D97-AF65-F5344CB8AC3E}">
+        <p14:creationId xmlns:p14="http://schemas.microsoft.com/office/powerpoint/2010/main" val="1208527875"/>
+      </p:ext>
+    </p:extLst>
+  </p:cSld>
+  <p:clrMapOvr>
+    <a:masterClrMapping/>
+  </p:clrMapOvr>
+  <p:timing>
+    <p:tnLst>
+      <p:par>
+        <p:cTn id="1" dur="indefinite" restart="never" nodeType="tmRoot"/>
+      </p:par>
+    </p:tnLst>
+  </p:timing>
 </p:sld>
 </file>
 
@@ -13415,7 +13683,7 @@
         </p:spPr>
         <p:txBody>
           <a:bodyPr>
-            <a:normAutofit fontScale="92500"/>
+            <a:normAutofit fontScale="92500" lnSpcReduction="20000"/>
           </a:bodyPr>
           <a:lstStyle/>
           <a:p>
@@ -13432,13 +13700,45 @@
               <a:buSzTx/>
             </a:pPr>
             <a:r>
+              <a:rPr lang="en-US" altLang="en-US" dirty="0" smtClean="0">
+                <a:solidFill>
+                  <a:schemeClr val="tx1"/>
+                </a:solidFill>
+                <a:cs typeface="Calibri" panose="020F0502020204030204" pitchFamily="34" charset="0"/>
+              </a:rPr>
+              <a:t>Dataset is taken from Term1 Project datasets.</a:t>
+            </a:r>
+          </a:p>
+          <a:p>
+            <a:pPr eaLnBrk="0" fontAlgn="base" hangingPunct="0">
+              <a:lnSpc>
+                <a:spcPct val="150000"/>
+              </a:lnSpc>
+              <a:spcBef>
+                <a:spcPct val="0"/>
+              </a:spcBef>
+              <a:spcAft>
+                <a:spcPct val="0"/>
+              </a:spcAft>
+              <a:buSzTx/>
+            </a:pPr>
+            <a:r>
+              <a:rPr lang="en-US" altLang="en-US" dirty="0" smtClean="0">
+                <a:solidFill>
+                  <a:schemeClr val="tx1"/>
+                </a:solidFill>
+                <a:cs typeface="Calibri" panose="020F0502020204030204" pitchFamily="34" charset="0"/>
+              </a:rPr>
+              <a:t>Collected </a:t>
+            </a:r>
+            <a:r>
               <a:rPr lang="en-US" altLang="en-US" dirty="0">
                 <a:solidFill>
                   <a:schemeClr val="tx1"/>
                 </a:solidFill>
                 <a:cs typeface="Calibri" panose="020F0502020204030204" pitchFamily="34" charset="0"/>
               </a:rPr>
-              <a:t>Collected from car sale advertisements for study/practice purposes in 2016. </a:t>
+              <a:t>from car sale advertisements for study/practice purposes in 2016. </a:t>
             </a:r>
           </a:p>
           <a:p>
@@ -13849,10 +14149,748 @@
   <p:clrMapOvr>
     <a:masterClrMapping/>
   </p:clrMapOvr>
+  <p:timing>
+    <p:tnLst>
+      <p:par>
+        <p:cTn id="1" dur="indefinite" restart="never" nodeType="tmRoot"/>
+      </p:par>
+    </p:tnLst>
+  </p:timing>
 </p:sld>
 </file>
 
 <file path=ppt/slides/slide3.xml><?xml version="1.0" encoding="utf-8"?>
+<p:sld xmlns:a="http://schemas.openxmlformats.org/drawingml/2006/main" xmlns:r="http://schemas.openxmlformats.org/officeDocument/2006/relationships" xmlns:p="http://schemas.openxmlformats.org/presentationml/2006/main">
+  <p:cSld>
+    <p:spTree>
+      <p:nvGrpSpPr>
+        <p:cNvPr id="1" name=""/>
+        <p:cNvGrpSpPr/>
+        <p:nvPr/>
+      </p:nvGrpSpPr>
+      <p:grpSpPr>
+        <a:xfrm>
+          <a:off x="0" y="0"/>
+          <a:ext cx="0" cy="0"/>
+          <a:chOff x="0" y="0"/>
+          <a:chExt cx="0" cy="0"/>
+        </a:xfrm>
+      </p:grpSpPr>
+      <p:sp>
+        <p:nvSpPr>
+          <p:cNvPr id="2" name="Title 1"/>
+          <p:cNvSpPr>
+            <a:spLocks noGrp="1"/>
+          </p:cNvSpPr>
+          <p:nvPr>
+            <p:ph type="title"/>
+          </p:nvPr>
+        </p:nvSpPr>
+        <p:spPr/>
+        <p:txBody>
+          <a:bodyPr/>
+          <a:lstStyle/>
+          <a:p>
+            <a:r>
+              <a:rPr lang="en-US" dirty="0" smtClean="0"/>
+              <a:t>Data Processing</a:t>
+            </a:r>
+            <a:endParaRPr lang="en-US" dirty="0"/>
+          </a:p>
+        </p:txBody>
+      </p:sp>
+      <p:sp>
+        <p:nvSpPr>
+          <p:cNvPr id="3" name="Content Placeholder 2"/>
+          <p:cNvSpPr>
+            <a:spLocks noGrp="1"/>
+          </p:cNvSpPr>
+          <p:nvPr>
+            <p:ph idx="1"/>
+          </p:nvPr>
+        </p:nvSpPr>
+        <p:spPr>
+          <a:xfrm>
+            <a:off x="497150" y="2281561"/>
+            <a:ext cx="11176986" cy="4163627"/>
+          </a:xfrm>
+        </p:spPr>
+        <p:txBody>
+          <a:bodyPr>
+            <a:normAutofit/>
+          </a:bodyPr>
+          <a:lstStyle/>
+          <a:p>
+            <a:pPr eaLnBrk="0" fontAlgn="base" hangingPunct="0">
+              <a:lnSpc>
+                <a:spcPct val="150000"/>
+              </a:lnSpc>
+              <a:spcBef>
+                <a:spcPct val="0"/>
+              </a:spcBef>
+              <a:spcAft>
+                <a:spcPct val="0"/>
+              </a:spcAft>
+              <a:buSzTx/>
+            </a:pPr>
+            <a:r>
+              <a:rPr lang="en-US" altLang="en-US" dirty="0" smtClean="0">
+                <a:solidFill>
+                  <a:schemeClr val="tx1"/>
+                </a:solidFill>
+                <a:cs typeface="Calibri" panose="020F0502020204030204" pitchFamily="34" charset="0"/>
+              </a:rPr>
+              <a:t>Data Issues.</a:t>
+            </a:r>
+          </a:p>
+          <a:p>
+            <a:pPr lvl="1" eaLnBrk="0" fontAlgn="base" hangingPunct="0">
+              <a:lnSpc>
+                <a:spcPct val="150000"/>
+              </a:lnSpc>
+              <a:spcBef>
+                <a:spcPct val="0"/>
+              </a:spcBef>
+              <a:spcAft>
+                <a:spcPct val="0"/>
+              </a:spcAft>
+              <a:buSzTx/>
+            </a:pPr>
+            <a:r>
+              <a:rPr lang="en-US" altLang="en-US" b="1" i="1" dirty="0" smtClean="0">
+                <a:solidFill>
+                  <a:schemeClr val="tx1"/>
+                </a:solidFill>
+                <a:cs typeface="Calibri" panose="020F0502020204030204" pitchFamily="34" charset="0"/>
+              </a:rPr>
+              <a:t>price</a:t>
+            </a:r>
+            <a:r>
+              <a:rPr lang="en-US" altLang="en-US" dirty="0" smtClean="0">
+                <a:solidFill>
+                  <a:schemeClr val="tx1"/>
+                </a:solidFill>
+                <a:cs typeface="Calibri" panose="020F0502020204030204" pitchFamily="34" charset="0"/>
+              </a:rPr>
+              <a:t> has </a:t>
+            </a:r>
+            <a:r>
+              <a:rPr lang="en-US" altLang="en-US" b="1" dirty="0" smtClean="0">
+                <a:solidFill>
+                  <a:schemeClr val="tx1"/>
+                </a:solidFill>
+                <a:cs typeface="Calibri" panose="020F0502020204030204" pitchFamily="34" charset="0"/>
+              </a:rPr>
+              <a:t>zero</a:t>
+            </a:r>
+            <a:r>
+              <a:rPr lang="en-US" altLang="en-US" dirty="0" smtClean="0">
+                <a:solidFill>
+                  <a:schemeClr val="tx1"/>
+                </a:solidFill>
+                <a:cs typeface="Calibri" panose="020F0502020204030204" pitchFamily="34" charset="0"/>
+              </a:rPr>
+              <a:t> values which needs to be considered as </a:t>
+            </a:r>
+            <a:r>
+              <a:rPr lang="en-US" altLang="en-US" dirty="0" err="1" smtClean="0">
+                <a:solidFill>
+                  <a:schemeClr val="tx1"/>
+                </a:solidFill>
+                <a:cs typeface="Calibri" panose="020F0502020204030204" pitchFamily="34" charset="0"/>
+              </a:rPr>
+              <a:t>NaN</a:t>
+            </a:r>
+            <a:r>
+              <a:rPr lang="en-US" altLang="en-US" dirty="0" smtClean="0">
+                <a:solidFill>
+                  <a:schemeClr val="tx1"/>
+                </a:solidFill>
+                <a:cs typeface="Calibri" panose="020F0502020204030204" pitchFamily="34" charset="0"/>
+              </a:rPr>
+              <a:t>.</a:t>
+            </a:r>
+          </a:p>
+          <a:p>
+            <a:pPr lvl="1" eaLnBrk="0" fontAlgn="base" hangingPunct="0">
+              <a:lnSpc>
+                <a:spcPct val="150000"/>
+              </a:lnSpc>
+              <a:spcBef>
+                <a:spcPct val="0"/>
+              </a:spcBef>
+              <a:spcAft>
+                <a:spcPct val="0"/>
+              </a:spcAft>
+              <a:buSzTx/>
+            </a:pPr>
+            <a:r>
+              <a:rPr lang="en-US" altLang="en-US" b="1" i="1" dirty="0" err="1" smtClean="0">
+                <a:solidFill>
+                  <a:schemeClr val="tx1"/>
+                </a:solidFill>
+                <a:cs typeface="Calibri" panose="020F0502020204030204" pitchFamily="34" charset="0"/>
+              </a:rPr>
+              <a:t>engV</a:t>
+            </a:r>
+            <a:r>
+              <a:rPr lang="en-US" altLang="en-US" dirty="0" smtClean="0">
+                <a:solidFill>
+                  <a:schemeClr val="tx1"/>
+                </a:solidFill>
+                <a:cs typeface="Calibri" panose="020F0502020204030204" pitchFamily="34" charset="0"/>
+              </a:rPr>
+              <a:t> and </a:t>
+            </a:r>
+            <a:r>
+              <a:rPr lang="en-US" altLang="en-US" b="1" i="1" dirty="0" smtClean="0">
+                <a:solidFill>
+                  <a:schemeClr val="tx1"/>
+                </a:solidFill>
+                <a:cs typeface="Calibri" panose="020F0502020204030204" pitchFamily="34" charset="0"/>
+              </a:rPr>
+              <a:t>drive</a:t>
+            </a:r>
+            <a:r>
+              <a:rPr lang="en-US" altLang="en-US" dirty="0" smtClean="0">
+                <a:solidFill>
+                  <a:schemeClr val="tx1"/>
+                </a:solidFill>
+                <a:cs typeface="Calibri" panose="020F0502020204030204" pitchFamily="34" charset="0"/>
+              </a:rPr>
+              <a:t> has </a:t>
+            </a:r>
+            <a:r>
+              <a:rPr lang="en-US" altLang="en-US" dirty="0" err="1" smtClean="0">
+                <a:solidFill>
+                  <a:schemeClr val="tx1"/>
+                </a:solidFill>
+                <a:cs typeface="Calibri" panose="020F0502020204030204" pitchFamily="34" charset="0"/>
+              </a:rPr>
+              <a:t>NaN</a:t>
+            </a:r>
+            <a:r>
+              <a:rPr lang="en-US" altLang="en-US" dirty="0" smtClean="0">
+                <a:solidFill>
+                  <a:schemeClr val="tx1"/>
+                </a:solidFill>
+                <a:cs typeface="Calibri" panose="020F0502020204030204" pitchFamily="34" charset="0"/>
+              </a:rPr>
+              <a:t> Values.</a:t>
+            </a:r>
+          </a:p>
+          <a:p>
+            <a:pPr lvl="1" eaLnBrk="0" fontAlgn="base" hangingPunct="0">
+              <a:lnSpc>
+                <a:spcPct val="150000"/>
+              </a:lnSpc>
+              <a:spcBef>
+                <a:spcPct val="0"/>
+              </a:spcBef>
+              <a:spcAft>
+                <a:spcPct val="0"/>
+              </a:spcAft>
+              <a:buSzTx/>
+            </a:pPr>
+            <a:r>
+              <a:rPr lang="en-US" altLang="en-US" dirty="0" smtClean="0">
+                <a:solidFill>
+                  <a:schemeClr val="tx1"/>
+                </a:solidFill>
+                <a:cs typeface="Calibri" panose="020F0502020204030204" pitchFamily="34" charset="0"/>
+              </a:rPr>
+              <a:t>There are duplicate observations.</a:t>
+            </a:r>
+          </a:p>
+          <a:p>
+            <a:pPr eaLnBrk="0" fontAlgn="base" hangingPunct="0">
+              <a:lnSpc>
+                <a:spcPct val="150000"/>
+              </a:lnSpc>
+              <a:spcBef>
+                <a:spcPct val="0"/>
+              </a:spcBef>
+              <a:spcAft>
+                <a:spcPct val="0"/>
+              </a:spcAft>
+              <a:buSzTx/>
+            </a:pPr>
+            <a:r>
+              <a:rPr lang="en-US" altLang="en-US" dirty="0" smtClean="0">
+                <a:solidFill>
+                  <a:schemeClr val="tx1"/>
+                </a:solidFill>
+                <a:cs typeface="Calibri" panose="020F0502020204030204" pitchFamily="34" charset="0"/>
+              </a:rPr>
+              <a:t>Data Cleansing</a:t>
+            </a:r>
+          </a:p>
+          <a:p>
+            <a:pPr lvl="1" eaLnBrk="0" fontAlgn="base" hangingPunct="0">
+              <a:lnSpc>
+                <a:spcPct val="150000"/>
+              </a:lnSpc>
+              <a:spcBef>
+                <a:spcPct val="0"/>
+              </a:spcBef>
+              <a:spcAft>
+                <a:spcPct val="0"/>
+              </a:spcAft>
+              <a:buSzTx/>
+            </a:pPr>
+            <a:r>
+              <a:rPr lang="en-US" altLang="en-US" dirty="0" smtClean="0">
+                <a:solidFill>
+                  <a:schemeClr val="tx1"/>
+                </a:solidFill>
+                <a:cs typeface="Calibri" panose="020F0502020204030204" pitchFamily="34" charset="0"/>
+              </a:rPr>
+              <a:t>Replaced </a:t>
+            </a:r>
+            <a:r>
+              <a:rPr lang="en-US" altLang="en-US" b="1" i="1" dirty="0" smtClean="0">
+                <a:solidFill>
+                  <a:schemeClr val="tx1"/>
+                </a:solidFill>
+                <a:cs typeface="Calibri" panose="020F0502020204030204" pitchFamily="34" charset="0"/>
+              </a:rPr>
+              <a:t>price</a:t>
+            </a:r>
+            <a:r>
+              <a:rPr lang="en-US" altLang="en-US" dirty="0" smtClean="0">
+                <a:solidFill>
+                  <a:schemeClr val="tx1"/>
+                </a:solidFill>
+                <a:cs typeface="Calibri" panose="020F0502020204030204" pitchFamily="34" charset="0"/>
+              </a:rPr>
+              <a:t> and </a:t>
+            </a:r>
+            <a:r>
+              <a:rPr lang="en-US" altLang="en-US" b="1" i="1" dirty="0" err="1" smtClean="0">
+                <a:solidFill>
+                  <a:schemeClr val="tx1"/>
+                </a:solidFill>
+                <a:cs typeface="Calibri" panose="020F0502020204030204" pitchFamily="34" charset="0"/>
+              </a:rPr>
+              <a:t>engV</a:t>
+            </a:r>
+            <a:r>
+              <a:rPr lang="en-US" altLang="en-US" dirty="0" smtClean="0">
+                <a:solidFill>
+                  <a:schemeClr val="tx1"/>
+                </a:solidFill>
+                <a:cs typeface="Calibri" panose="020F0502020204030204" pitchFamily="34" charset="0"/>
+              </a:rPr>
+              <a:t> with </a:t>
+            </a:r>
+            <a:r>
+              <a:rPr lang="en-US" altLang="en-US" b="1" dirty="0" smtClean="0">
+                <a:solidFill>
+                  <a:schemeClr val="tx1"/>
+                </a:solidFill>
+                <a:cs typeface="Calibri" panose="020F0502020204030204" pitchFamily="34" charset="0"/>
+              </a:rPr>
+              <a:t>mean</a:t>
+            </a:r>
+            <a:r>
+              <a:rPr lang="en-US" altLang="en-US" dirty="0" smtClean="0">
+                <a:solidFill>
+                  <a:schemeClr val="tx1"/>
+                </a:solidFill>
+                <a:cs typeface="Calibri" panose="020F0502020204030204" pitchFamily="34" charset="0"/>
+              </a:rPr>
+              <a:t> value for same </a:t>
+            </a:r>
+            <a:r>
+              <a:rPr lang="en-US" altLang="en-US" b="1" i="1" dirty="0" smtClean="0">
+                <a:solidFill>
+                  <a:schemeClr val="tx1"/>
+                </a:solidFill>
+                <a:cs typeface="Calibri" panose="020F0502020204030204" pitchFamily="34" charset="0"/>
+              </a:rPr>
+              <a:t>car</a:t>
+            </a:r>
+            <a:r>
+              <a:rPr lang="en-US" altLang="en-US" dirty="0" smtClean="0">
+                <a:solidFill>
+                  <a:schemeClr val="tx1"/>
+                </a:solidFill>
+                <a:cs typeface="Calibri" panose="020F0502020204030204" pitchFamily="34" charset="0"/>
+              </a:rPr>
+              <a:t> and </a:t>
+            </a:r>
+            <a:r>
+              <a:rPr lang="en-US" altLang="en-US" b="1" i="1" dirty="0" smtClean="0">
+                <a:solidFill>
+                  <a:schemeClr val="tx1"/>
+                </a:solidFill>
+                <a:cs typeface="Calibri" panose="020F0502020204030204" pitchFamily="34" charset="0"/>
+              </a:rPr>
+              <a:t>model.</a:t>
+            </a:r>
+          </a:p>
+          <a:p>
+            <a:pPr lvl="1" eaLnBrk="0" fontAlgn="base" hangingPunct="0">
+              <a:lnSpc>
+                <a:spcPct val="150000"/>
+              </a:lnSpc>
+              <a:spcBef>
+                <a:spcPct val="0"/>
+              </a:spcBef>
+              <a:spcAft>
+                <a:spcPct val="0"/>
+              </a:spcAft>
+              <a:buSzTx/>
+            </a:pPr>
+            <a:r>
+              <a:rPr lang="en-US" altLang="en-US" dirty="0" smtClean="0">
+                <a:solidFill>
+                  <a:schemeClr val="tx1"/>
+                </a:solidFill>
+                <a:cs typeface="Calibri" panose="020F0502020204030204" pitchFamily="34" charset="0"/>
+              </a:rPr>
+              <a:t>Replaced</a:t>
+            </a:r>
+            <a:r>
+              <a:rPr lang="en-US" altLang="en-US" b="1" i="1" dirty="0" smtClean="0">
+                <a:solidFill>
+                  <a:schemeClr val="tx1"/>
+                </a:solidFill>
+                <a:cs typeface="Calibri" panose="020F0502020204030204" pitchFamily="34" charset="0"/>
+              </a:rPr>
+              <a:t> drive </a:t>
+            </a:r>
+            <a:r>
+              <a:rPr lang="en-US" altLang="en-US" dirty="0" smtClean="0">
+                <a:solidFill>
+                  <a:schemeClr val="tx1"/>
+                </a:solidFill>
+                <a:cs typeface="Calibri" panose="020F0502020204030204" pitchFamily="34" charset="0"/>
+              </a:rPr>
+              <a:t>with</a:t>
+            </a:r>
+            <a:r>
+              <a:rPr lang="en-US" altLang="en-US" b="1" i="1" dirty="0" smtClean="0">
+                <a:solidFill>
+                  <a:schemeClr val="tx1"/>
+                </a:solidFill>
+                <a:cs typeface="Calibri" panose="020F0502020204030204" pitchFamily="34" charset="0"/>
+              </a:rPr>
+              <a:t> </a:t>
+            </a:r>
+            <a:r>
+              <a:rPr lang="en-US" altLang="en-US" b="1" dirty="0" smtClean="0">
+                <a:solidFill>
+                  <a:schemeClr val="tx1"/>
+                </a:solidFill>
+                <a:cs typeface="Calibri" panose="020F0502020204030204" pitchFamily="34" charset="0"/>
+              </a:rPr>
+              <a:t>m</a:t>
+            </a:r>
+            <a:r>
+              <a:rPr lang="en-US" altLang="en-US" b="1" dirty="0" smtClean="0">
+                <a:solidFill>
+                  <a:schemeClr val="tx1"/>
+                </a:solidFill>
+                <a:cs typeface="Calibri" panose="020F0502020204030204" pitchFamily="34" charset="0"/>
+              </a:rPr>
+              <a:t>ode.</a:t>
+            </a:r>
+          </a:p>
+          <a:p>
+            <a:pPr lvl="1" eaLnBrk="0" fontAlgn="base" hangingPunct="0">
+              <a:lnSpc>
+                <a:spcPct val="150000"/>
+              </a:lnSpc>
+              <a:spcBef>
+                <a:spcPct val="0"/>
+              </a:spcBef>
+              <a:spcAft>
+                <a:spcPct val="0"/>
+              </a:spcAft>
+              <a:buSzTx/>
+            </a:pPr>
+            <a:r>
+              <a:rPr lang="en-US" altLang="en-US" dirty="0" smtClean="0">
+                <a:solidFill>
+                  <a:schemeClr val="tx1"/>
+                </a:solidFill>
+                <a:cs typeface="Calibri" panose="020F0502020204030204" pitchFamily="34" charset="0"/>
+              </a:rPr>
+              <a:t>Dropped duplicates by keeping only first.</a:t>
+            </a:r>
+          </a:p>
+          <a:p>
+            <a:pPr lvl="1" eaLnBrk="0" fontAlgn="base" hangingPunct="0">
+              <a:lnSpc>
+                <a:spcPct val="150000"/>
+              </a:lnSpc>
+              <a:spcBef>
+                <a:spcPct val="0"/>
+              </a:spcBef>
+              <a:spcAft>
+                <a:spcPct val="0"/>
+              </a:spcAft>
+              <a:buSzTx/>
+            </a:pPr>
+            <a:r>
+              <a:rPr lang="en-US" altLang="en-US" dirty="0" smtClean="0">
+                <a:solidFill>
+                  <a:schemeClr val="tx1"/>
+                </a:solidFill>
+                <a:cs typeface="Calibri" panose="020F0502020204030204" pitchFamily="34" charset="0"/>
+              </a:rPr>
+              <a:t>Dropped Remaining </a:t>
+            </a:r>
+            <a:r>
+              <a:rPr lang="en-US" altLang="en-US" dirty="0" err="1" smtClean="0">
+                <a:solidFill>
+                  <a:schemeClr val="tx1"/>
+                </a:solidFill>
+                <a:cs typeface="Calibri" panose="020F0502020204030204" pitchFamily="34" charset="0"/>
+              </a:rPr>
+              <a:t>NaNs</a:t>
+            </a:r>
+            <a:r>
+              <a:rPr lang="en-US" altLang="en-US" dirty="0" smtClean="0">
+                <a:solidFill>
+                  <a:schemeClr val="tx1"/>
+                </a:solidFill>
+                <a:cs typeface="Calibri" panose="020F0502020204030204" pitchFamily="34" charset="0"/>
+              </a:rPr>
+              <a:t>.</a:t>
+            </a:r>
+          </a:p>
+          <a:p>
+            <a:pPr lvl="1" eaLnBrk="0" fontAlgn="base" hangingPunct="0">
+              <a:lnSpc>
+                <a:spcPct val="150000"/>
+              </a:lnSpc>
+              <a:spcBef>
+                <a:spcPct val="0"/>
+              </a:spcBef>
+              <a:spcAft>
+                <a:spcPct val="0"/>
+              </a:spcAft>
+              <a:buSzTx/>
+            </a:pPr>
+            <a:endParaRPr lang="en-US" altLang="en-US" dirty="0">
+              <a:solidFill>
+                <a:schemeClr val="tx1"/>
+              </a:solidFill>
+              <a:cs typeface="Calibri" panose="020F0502020204030204" pitchFamily="34" charset="0"/>
+            </a:endParaRPr>
+          </a:p>
+          <a:p>
+            <a:endParaRPr lang="en-US" dirty="0"/>
+          </a:p>
+        </p:txBody>
+      </p:sp>
+    </p:spTree>
+    <p:extLst>
+      <p:ext uri="{BB962C8B-B14F-4D97-AF65-F5344CB8AC3E}">
+        <p14:creationId xmlns:p14="http://schemas.microsoft.com/office/powerpoint/2010/main" val="2977673420"/>
+      </p:ext>
+    </p:extLst>
+  </p:cSld>
+  <p:clrMapOvr>
+    <a:masterClrMapping/>
+  </p:clrMapOvr>
+  <p:timing>
+    <p:tnLst>
+      <p:par>
+        <p:cTn id="1" dur="indefinite" restart="never" nodeType="tmRoot"/>
+      </p:par>
+    </p:tnLst>
+  </p:timing>
+</p:sld>
+</file>
+
+<file path=ppt/slides/slide4.xml><?xml version="1.0" encoding="utf-8"?>
+<p:sld xmlns:a="http://schemas.openxmlformats.org/drawingml/2006/main" xmlns:r="http://schemas.openxmlformats.org/officeDocument/2006/relationships" xmlns:p="http://schemas.openxmlformats.org/presentationml/2006/main">
+  <p:cSld>
+    <p:spTree>
+      <p:nvGrpSpPr>
+        <p:cNvPr id="1" name=""/>
+        <p:cNvGrpSpPr/>
+        <p:nvPr/>
+      </p:nvGrpSpPr>
+      <p:grpSpPr>
+        <a:xfrm>
+          <a:off x="0" y="0"/>
+          <a:ext cx="0" cy="0"/>
+          <a:chOff x="0" y="0"/>
+          <a:chExt cx="0" cy="0"/>
+        </a:xfrm>
+      </p:grpSpPr>
+      <p:sp>
+        <p:nvSpPr>
+          <p:cNvPr id="2" name="Title 1"/>
+          <p:cNvSpPr>
+            <a:spLocks noGrp="1"/>
+          </p:cNvSpPr>
+          <p:nvPr>
+            <p:ph type="title"/>
+          </p:nvPr>
+        </p:nvSpPr>
+        <p:spPr/>
+        <p:txBody>
+          <a:bodyPr/>
+          <a:lstStyle/>
+          <a:p>
+            <a:r>
+              <a:rPr lang="en-US" dirty="0" smtClean="0"/>
+              <a:t>Data Preparation</a:t>
+            </a:r>
+            <a:endParaRPr lang="en-US" dirty="0"/>
+          </a:p>
+        </p:txBody>
+      </p:sp>
+      <p:sp>
+        <p:nvSpPr>
+          <p:cNvPr id="3" name="Content Placeholder 2"/>
+          <p:cNvSpPr>
+            <a:spLocks noGrp="1"/>
+          </p:cNvSpPr>
+          <p:nvPr>
+            <p:ph idx="1"/>
+          </p:nvPr>
+        </p:nvSpPr>
+        <p:spPr>
+          <a:xfrm>
+            <a:off x="497150" y="3036163"/>
+            <a:ext cx="11176986" cy="2814221"/>
+          </a:xfrm>
+        </p:spPr>
+        <p:txBody>
+          <a:bodyPr>
+            <a:noAutofit/>
+          </a:bodyPr>
+          <a:lstStyle/>
+          <a:p>
+            <a:pPr eaLnBrk="0" fontAlgn="base" hangingPunct="0">
+              <a:lnSpc>
+                <a:spcPct val="150000"/>
+              </a:lnSpc>
+              <a:spcBef>
+                <a:spcPct val="0"/>
+              </a:spcBef>
+              <a:spcAft>
+                <a:spcPct val="0"/>
+              </a:spcAft>
+              <a:buSzTx/>
+            </a:pPr>
+            <a:r>
+              <a:rPr lang="en-US" altLang="en-US" sz="2200" dirty="0" err="1" smtClean="0">
+                <a:solidFill>
+                  <a:schemeClr val="tx1"/>
+                </a:solidFill>
+                <a:cs typeface="Calibri" panose="020F0502020204030204" pitchFamily="34" charset="0"/>
+              </a:rPr>
+              <a:t>Dummys</a:t>
+            </a:r>
+            <a:r>
+              <a:rPr lang="en-US" altLang="en-US" sz="2200" dirty="0" smtClean="0">
+                <a:solidFill>
+                  <a:schemeClr val="tx1"/>
+                </a:solidFill>
+                <a:cs typeface="Calibri" panose="020F0502020204030204" pitchFamily="34" charset="0"/>
+              </a:rPr>
+              <a:t> for Categorical data.</a:t>
+            </a:r>
+          </a:p>
+          <a:p>
+            <a:pPr eaLnBrk="0" fontAlgn="base" hangingPunct="0">
+              <a:lnSpc>
+                <a:spcPct val="150000"/>
+              </a:lnSpc>
+              <a:spcBef>
+                <a:spcPct val="0"/>
+              </a:spcBef>
+              <a:spcAft>
+                <a:spcPct val="0"/>
+              </a:spcAft>
+              <a:buSzTx/>
+            </a:pPr>
+            <a:r>
+              <a:rPr lang="en-US" altLang="en-US" sz="2200" dirty="0" smtClean="0">
+                <a:solidFill>
+                  <a:schemeClr val="tx1"/>
+                </a:solidFill>
+                <a:cs typeface="Calibri" panose="020F0502020204030204" pitchFamily="34" charset="0"/>
+              </a:rPr>
+              <a:t>Drop Outliers</a:t>
+            </a:r>
+          </a:p>
+          <a:p>
+            <a:pPr eaLnBrk="0" fontAlgn="base" hangingPunct="0">
+              <a:lnSpc>
+                <a:spcPct val="150000"/>
+              </a:lnSpc>
+              <a:spcBef>
+                <a:spcPct val="0"/>
+              </a:spcBef>
+              <a:spcAft>
+                <a:spcPct val="0"/>
+              </a:spcAft>
+              <a:buSzTx/>
+            </a:pPr>
+            <a:r>
+              <a:rPr lang="en-US" altLang="en-US" sz="2200" dirty="0" smtClean="0">
+                <a:solidFill>
+                  <a:schemeClr val="tx1"/>
+                </a:solidFill>
+                <a:cs typeface="Calibri" panose="020F0502020204030204" pitchFamily="34" charset="0"/>
+              </a:rPr>
+              <a:t>Scaling Variables for standardization.</a:t>
+            </a:r>
+          </a:p>
+          <a:p>
+            <a:pPr eaLnBrk="0" fontAlgn="base" hangingPunct="0">
+              <a:lnSpc>
+                <a:spcPct val="150000"/>
+              </a:lnSpc>
+              <a:spcBef>
+                <a:spcPct val="0"/>
+              </a:spcBef>
+              <a:spcAft>
+                <a:spcPct val="0"/>
+              </a:spcAft>
+              <a:buSzTx/>
+            </a:pPr>
+            <a:r>
+              <a:rPr lang="en-US" altLang="en-US" sz="2200" dirty="0" smtClean="0">
+                <a:solidFill>
+                  <a:schemeClr val="tx1"/>
+                </a:solidFill>
+                <a:cs typeface="Calibri" panose="020F0502020204030204" pitchFamily="34" charset="0"/>
+              </a:rPr>
+              <a:t>Feature Selection based on iterations and correlation between variables.</a:t>
+            </a:r>
+          </a:p>
+        </p:txBody>
+      </p:sp>
+    </p:spTree>
+    <p:extLst>
+      <p:ext uri="{BB962C8B-B14F-4D97-AF65-F5344CB8AC3E}">
+        <p14:creationId xmlns:p14="http://schemas.microsoft.com/office/powerpoint/2010/main" val="4270918354"/>
+      </p:ext>
+    </p:extLst>
+  </p:cSld>
+  <p:clrMapOvr>
+    <a:masterClrMapping/>
+  </p:clrMapOvr>
+  <p:timing>
+    <p:tnLst>
+      <p:par>
+        <p:cTn id="1" dur="indefinite" restart="never" nodeType="tmRoot"/>
+      </p:par>
+    </p:tnLst>
+  </p:timing>
+</p:sld>
+</file>
+
+<file path=ppt/slides/slide5.xml><?xml version="1.0" encoding="utf-8"?>
 <p:sld xmlns:a="http://schemas.openxmlformats.org/drawingml/2006/main" xmlns:r="http://schemas.openxmlformats.org/officeDocument/2006/relationships" xmlns:p="http://schemas.openxmlformats.org/presentationml/2006/main">
   <p:cSld>
     <p:spTree>
@@ -13897,166 +14935,15 @@
           </a:p>
         </p:txBody>
       </p:sp>
-      <p:sp>
-        <p:nvSpPr>
-          <p:cNvPr id="3" name="Content Placeholder 2"/>
-          <p:cNvSpPr>
-            <a:spLocks noGrp="1"/>
-          </p:cNvSpPr>
+      <p:pic>
+        <p:nvPicPr>
+          <p:cNvPr id="5" name="Content Placeholder 4"/>
+          <p:cNvPicPr>
+            <a:picLocks noGrp="1" noChangeAspect="1"/>
+          </p:cNvPicPr>
           <p:nvPr>
             <p:ph idx="1"/>
           </p:nvPr>
-        </p:nvSpPr>
-        <p:spPr>
-          <a:xfrm>
-            <a:off x="5514392" y="1447800"/>
-            <a:ext cx="5831632" cy="4572000"/>
-          </a:xfrm>
-        </p:spPr>
-        <p:txBody>
-          <a:bodyPr>
-            <a:normAutofit fontScale="92500" lnSpcReduction="10000"/>
-          </a:bodyPr>
-          <a:lstStyle/>
-          <a:p>
-            <a:r>
-              <a:rPr lang="en-US" dirty="0" err="1"/>
-              <a:t>sklearn.linear_model.LinearRegression</a:t>
-            </a:r>
-            <a:endParaRPr lang="en-US" dirty="0"/>
-          </a:p>
-          <a:p>
-            <a:r>
-              <a:rPr lang="en-US" dirty="0" err="1" smtClean="0"/>
-              <a:t>sklearn.ensemble.AdaBoostRegressor</a:t>
-            </a:r>
-            <a:endParaRPr lang="en-US" dirty="0"/>
-          </a:p>
-          <a:p>
-            <a:r>
-              <a:rPr lang="en-US" dirty="0" err="1" smtClean="0"/>
-              <a:t>sklearn.tree.DecisionTreeRegressor</a:t>
-            </a:r>
-            <a:endParaRPr lang="en-US" dirty="0" smtClean="0"/>
-          </a:p>
-          <a:p>
-            <a:r>
-              <a:rPr lang="en-US" dirty="0" err="1" smtClean="0"/>
-              <a:t>sklearn.ensemble.RandomForestRegressor</a:t>
-            </a:r>
-            <a:endParaRPr lang="en-US" dirty="0"/>
-          </a:p>
-          <a:p>
-            <a:r>
-              <a:rPr lang="en-US" dirty="0" err="1"/>
-              <a:t>sklearn.ensemble.GradientBoostingRegressor</a:t>
-            </a:r>
-            <a:endParaRPr lang="en-US" dirty="0"/>
-          </a:p>
-          <a:p>
-            <a:r>
-              <a:rPr lang="en-US" dirty="0" err="1" smtClean="0"/>
-              <a:t>sklearn.ensemble.BaggingRegressor</a:t>
-            </a:r>
-            <a:endParaRPr lang="en-US" dirty="0"/>
-          </a:p>
-          <a:p>
-            <a:r>
-              <a:rPr lang="en-US" dirty="0" err="1"/>
-              <a:t>sklearn.ensemble.ExtraTreesRegressor</a:t>
-            </a:r>
-            <a:endParaRPr lang="en-US" dirty="0"/>
-          </a:p>
-          <a:p>
-            <a:r>
-              <a:rPr lang="en-US" dirty="0" err="1"/>
-              <a:t>sklearn.cross_decomposition.PLSRegression</a:t>
-            </a:r>
-            <a:endParaRPr lang="en-US" dirty="0"/>
-          </a:p>
-          <a:p>
-            <a:r>
-              <a:rPr lang="en-US" dirty="0" err="1" smtClean="0"/>
-              <a:t>sklearn.linear_model.BayesianRidge</a:t>
-            </a:r>
-            <a:endParaRPr lang="en-US" dirty="0"/>
-          </a:p>
-          <a:p>
-            <a:r>
-              <a:rPr lang="en-US" dirty="0" err="1"/>
-              <a:t>sklearn.linear_model.HuberRegressor</a:t>
-            </a:r>
-            <a:endParaRPr lang="en-US" dirty="0"/>
-          </a:p>
-          <a:p>
-            <a:r>
-              <a:rPr lang="en-US" dirty="0" err="1" smtClean="0"/>
-              <a:t>sklearn.linear_model.Lasso</a:t>
-            </a:r>
-            <a:endParaRPr lang="en-US" dirty="0" smtClean="0"/>
-          </a:p>
-          <a:p>
-            <a:r>
-              <a:rPr lang="en-US" dirty="0" err="1" smtClean="0"/>
-              <a:t>sklearn.preprocessing.polynomialFeatures</a:t>
-            </a:r>
-            <a:r>
-              <a:rPr lang="en-US" dirty="0" smtClean="0"/>
-              <a:t> with </a:t>
-            </a:r>
-            <a:r>
-              <a:rPr lang="en-US" dirty="0" err="1" smtClean="0"/>
-              <a:t>LinearRegression</a:t>
-            </a:r>
-            <a:endParaRPr lang="en-US" dirty="0" smtClean="0"/>
-          </a:p>
-        </p:txBody>
-      </p:sp>
-      <p:sp>
-        <p:nvSpPr>
-          <p:cNvPr id="4" name="Text Placeholder 3"/>
-          <p:cNvSpPr>
-            <a:spLocks noGrp="1"/>
-          </p:cNvSpPr>
-          <p:nvPr>
-            <p:ph type="body" sz="half" idx="2"/>
-          </p:nvPr>
-        </p:nvSpPr>
-        <p:spPr>
-          <a:xfrm>
-            <a:off x="933057" y="2570257"/>
-            <a:ext cx="3314409" cy="528320"/>
-          </a:xfrm>
-        </p:spPr>
-        <p:txBody>
-          <a:bodyPr/>
-          <a:lstStyle/>
-          <a:p>
-            <a:r>
-              <a:rPr lang="en-US" dirty="0" smtClean="0"/>
-              <a:t>Compared based on R</a:t>
-            </a:r>
-            <a:r>
-              <a:rPr lang="en-US" baseline="30000" dirty="0" smtClean="0"/>
-              <a:t>2</a:t>
-            </a:r>
-            <a:r>
-              <a:rPr lang="en-US" dirty="0" smtClean="0"/>
-              <a:t> - Values</a:t>
-            </a:r>
-          </a:p>
-          <a:p>
-            <a:endParaRPr lang="en-US" dirty="0"/>
-          </a:p>
-        </p:txBody>
-      </p:sp>
-      <p:pic>
-        <p:nvPicPr>
-          <p:cNvPr id="6" name="Picture 5"/>
-          <p:cNvPicPr>
-            <a:picLocks noChangeAspect="1"/>
-          </p:cNvPicPr>
-          <p:nvPr/>
         </p:nvPicPr>
         <p:blipFill>
           <a:blip r:embed="rId2">
@@ -14072,14 +14959,331 @@
         </p:blipFill>
         <p:spPr>
           <a:xfrm>
-            <a:off x="634482" y="3286422"/>
-            <a:ext cx="3911561" cy="2955758"/>
+            <a:off x="5113538" y="1227408"/>
+            <a:ext cx="6702641" cy="5235535"/>
           </a:xfrm>
-          <a:prstGeom prst="rect">
-            <a:avLst/>
-          </a:prstGeom>
         </p:spPr>
       </p:pic>
+      <p:sp>
+        <p:nvSpPr>
+          <p:cNvPr id="4" name="Text Placeholder 3"/>
+          <p:cNvSpPr>
+            <a:spLocks noGrp="1"/>
+          </p:cNvSpPr>
+          <p:nvPr>
+            <p:ph type="body" sz="half" idx="2"/>
+          </p:nvPr>
+        </p:nvSpPr>
+        <p:spPr>
+          <a:xfrm>
+            <a:off x="719091" y="2570257"/>
+            <a:ext cx="3852909" cy="3688500"/>
+          </a:xfrm>
+        </p:spPr>
+        <p:txBody>
+          <a:bodyPr>
+            <a:normAutofit fontScale="85000" lnSpcReduction="20000"/>
+          </a:bodyPr>
+          <a:lstStyle/>
+          <a:p>
+            <a:r>
+              <a:rPr lang="en-US" sz="1600" b="1" u="sng" dirty="0" smtClean="0">
+                <a:solidFill>
+                  <a:schemeClr val="accent6"/>
+                </a:solidFill>
+              </a:rPr>
+              <a:t>Compared </a:t>
+            </a:r>
+            <a:r>
+              <a:rPr lang="en-US" sz="1600" b="1" u="sng" dirty="0" smtClean="0">
+                <a:solidFill>
+                  <a:schemeClr val="accent6"/>
+                </a:solidFill>
+              </a:rPr>
+              <a:t>following based </a:t>
+            </a:r>
+            <a:r>
+              <a:rPr lang="en-US" sz="1600" b="1" u="sng" dirty="0" smtClean="0">
+                <a:solidFill>
+                  <a:schemeClr val="accent6"/>
+                </a:solidFill>
+              </a:rPr>
+              <a:t>on R</a:t>
+            </a:r>
+            <a:r>
+              <a:rPr lang="en-US" sz="1600" b="1" u="sng" baseline="30000" dirty="0" smtClean="0">
+                <a:solidFill>
+                  <a:schemeClr val="accent6"/>
+                </a:solidFill>
+              </a:rPr>
+              <a:t>2</a:t>
+            </a:r>
+            <a:r>
+              <a:rPr lang="en-US" sz="1600" b="1" u="sng" dirty="0" smtClean="0">
+                <a:solidFill>
+                  <a:schemeClr val="accent6"/>
+                </a:solidFill>
+              </a:rPr>
+              <a:t> - Values</a:t>
+            </a:r>
+          </a:p>
+          <a:p>
+            <a:pPr marL="285750" indent="-285750">
+              <a:buFont typeface="Arial" panose="020B0604020202020204" pitchFamily="34" charset="0"/>
+              <a:buChar char="•"/>
+            </a:pPr>
+            <a:r>
+              <a:rPr lang="en-US" dirty="0" err="1" smtClean="0">
+                <a:solidFill>
+                  <a:schemeClr val="accent6"/>
+                </a:solidFill>
+              </a:rPr>
+              <a:t>LinearRegression</a:t>
+            </a:r>
+            <a:endParaRPr lang="en-US" dirty="0">
+              <a:solidFill>
+                <a:schemeClr val="accent6"/>
+              </a:solidFill>
+            </a:endParaRPr>
+          </a:p>
+          <a:p>
+            <a:pPr marL="285750" indent="-285750">
+              <a:buFont typeface="Arial" panose="020B0604020202020204" pitchFamily="34" charset="0"/>
+              <a:buChar char="•"/>
+            </a:pPr>
+            <a:r>
+              <a:rPr lang="en-US" dirty="0" err="1" smtClean="0">
+                <a:solidFill>
+                  <a:schemeClr val="accent6"/>
+                </a:solidFill>
+              </a:rPr>
+              <a:t>AdaBoostRegressor</a:t>
+            </a:r>
+            <a:endParaRPr lang="en-US" dirty="0">
+              <a:solidFill>
+                <a:schemeClr val="accent6"/>
+              </a:solidFill>
+            </a:endParaRPr>
+          </a:p>
+          <a:p>
+            <a:pPr marL="285750" indent="-285750">
+              <a:buFont typeface="Arial" panose="020B0604020202020204" pitchFamily="34" charset="0"/>
+              <a:buChar char="•"/>
+            </a:pPr>
+            <a:r>
+              <a:rPr lang="en-US" dirty="0" err="1" smtClean="0">
+                <a:solidFill>
+                  <a:schemeClr val="accent6"/>
+                </a:solidFill>
+              </a:rPr>
+              <a:t>DecisionTreeRegressor</a:t>
+            </a:r>
+            <a:endParaRPr lang="en-US" dirty="0">
+              <a:solidFill>
+                <a:schemeClr val="accent6"/>
+              </a:solidFill>
+            </a:endParaRPr>
+          </a:p>
+          <a:p>
+            <a:pPr marL="285750" indent="-285750">
+              <a:buFont typeface="Arial" panose="020B0604020202020204" pitchFamily="34" charset="0"/>
+              <a:buChar char="•"/>
+            </a:pPr>
+            <a:r>
+              <a:rPr lang="en-US" dirty="0" err="1" smtClean="0">
+                <a:solidFill>
+                  <a:schemeClr val="accent6"/>
+                </a:solidFill>
+              </a:rPr>
+              <a:t>RandomForestRegressor</a:t>
+            </a:r>
+            <a:endParaRPr lang="en-US" dirty="0">
+              <a:solidFill>
+                <a:schemeClr val="accent6"/>
+              </a:solidFill>
+            </a:endParaRPr>
+          </a:p>
+          <a:p>
+            <a:pPr marL="285750" indent="-285750">
+              <a:buFont typeface="Arial" panose="020B0604020202020204" pitchFamily="34" charset="0"/>
+              <a:buChar char="•"/>
+            </a:pPr>
+            <a:r>
+              <a:rPr lang="en-US" dirty="0" err="1" smtClean="0">
+                <a:solidFill>
+                  <a:schemeClr val="accent6"/>
+                </a:solidFill>
+              </a:rPr>
+              <a:t>GradientBoostingRegressor</a:t>
+            </a:r>
+            <a:endParaRPr lang="en-US" dirty="0">
+              <a:solidFill>
+                <a:schemeClr val="accent6"/>
+              </a:solidFill>
+            </a:endParaRPr>
+          </a:p>
+          <a:p>
+            <a:pPr marL="285750" indent="-285750">
+              <a:buFont typeface="Arial" panose="020B0604020202020204" pitchFamily="34" charset="0"/>
+              <a:buChar char="•"/>
+            </a:pPr>
+            <a:r>
+              <a:rPr lang="en-US" dirty="0" err="1" smtClean="0">
+                <a:solidFill>
+                  <a:schemeClr val="accent6"/>
+                </a:solidFill>
+              </a:rPr>
+              <a:t>BaggingRegressor</a:t>
+            </a:r>
+            <a:endParaRPr lang="en-US" dirty="0">
+              <a:solidFill>
+                <a:schemeClr val="accent6"/>
+              </a:solidFill>
+            </a:endParaRPr>
+          </a:p>
+          <a:p>
+            <a:pPr marL="285750" indent="-285750">
+              <a:buFont typeface="Arial" panose="020B0604020202020204" pitchFamily="34" charset="0"/>
+              <a:buChar char="•"/>
+            </a:pPr>
+            <a:r>
+              <a:rPr lang="en-US" dirty="0" err="1" smtClean="0">
+                <a:solidFill>
+                  <a:schemeClr val="accent6"/>
+                </a:solidFill>
+              </a:rPr>
+              <a:t>ExtraTreesRegressor</a:t>
+            </a:r>
+            <a:endParaRPr lang="en-US" dirty="0">
+              <a:solidFill>
+                <a:schemeClr val="accent6"/>
+              </a:solidFill>
+            </a:endParaRPr>
+          </a:p>
+          <a:p>
+            <a:pPr marL="285750" indent="-285750">
+              <a:buFont typeface="Arial" panose="020B0604020202020204" pitchFamily="34" charset="0"/>
+              <a:buChar char="•"/>
+            </a:pPr>
+            <a:r>
+              <a:rPr lang="en-US" dirty="0" err="1" smtClean="0">
+                <a:solidFill>
+                  <a:schemeClr val="accent6"/>
+                </a:solidFill>
+              </a:rPr>
+              <a:t>PLSRegression</a:t>
+            </a:r>
+            <a:endParaRPr lang="en-US" dirty="0">
+              <a:solidFill>
+                <a:schemeClr val="accent6"/>
+              </a:solidFill>
+            </a:endParaRPr>
+          </a:p>
+          <a:p>
+            <a:pPr marL="285750" indent="-285750">
+              <a:buFont typeface="Arial" panose="020B0604020202020204" pitchFamily="34" charset="0"/>
+              <a:buChar char="•"/>
+            </a:pPr>
+            <a:r>
+              <a:rPr lang="en-US" dirty="0" err="1" smtClean="0">
+                <a:solidFill>
+                  <a:schemeClr val="accent6"/>
+                </a:solidFill>
+              </a:rPr>
+              <a:t>BayesianRidge</a:t>
+            </a:r>
+            <a:endParaRPr lang="en-US" dirty="0">
+              <a:solidFill>
+                <a:schemeClr val="accent6"/>
+              </a:solidFill>
+            </a:endParaRPr>
+          </a:p>
+          <a:p>
+            <a:pPr marL="285750" indent="-285750">
+              <a:buFont typeface="Arial" panose="020B0604020202020204" pitchFamily="34" charset="0"/>
+              <a:buChar char="•"/>
+            </a:pPr>
+            <a:r>
+              <a:rPr lang="en-US" dirty="0" err="1" smtClean="0">
+                <a:solidFill>
+                  <a:schemeClr val="accent6"/>
+                </a:solidFill>
+              </a:rPr>
+              <a:t>HuberRegressor</a:t>
+            </a:r>
+            <a:endParaRPr lang="en-US" dirty="0">
+              <a:solidFill>
+                <a:schemeClr val="accent6"/>
+              </a:solidFill>
+            </a:endParaRPr>
+          </a:p>
+          <a:p>
+            <a:pPr marL="285750" indent="-285750">
+              <a:buFont typeface="Arial" panose="020B0604020202020204" pitchFamily="34" charset="0"/>
+              <a:buChar char="•"/>
+            </a:pPr>
+            <a:r>
+              <a:rPr lang="en-US" dirty="0" smtClean="0">
+                <a:solidFill>
+                  <a:schemeClr val="accent6"/>
+                </a:solidFill>
+              </a:rPr>
+              <a:t>Lasso</a:t>
+            </a:r>
+            <a:endParaRPr lang="en-US" dirty="0">
+              <a:solidFill>
+                <a:schemeClr val="accent6"/>
+              </a:solidFill>
+            </a:endParaRPr>
+          </a:p>
+          <a:p>
+            <a:pPr marL="285750" indent="-285750">
+              <a:buFont typeface="Arial" panose="020B0604020202020204" pitchFamily="34" charset="0"/>
+              <a:buChar char="•"/>
+            </a:pPr>
+            <a:r>
+              <a:rPr lang="en-US" dirty="0" err="1" smtClean="0">
+                <a:solidFill>
+                  <a:schemeClr val="accent6"/>
+                </a:solidFill>
+              </a:rPr>
+              <a:t>polynomialFeatures</a:t>
+            </a:r>
+            <a:r>
+              <a:rPr lang="en-US" dirty="0" smtClean="0">
+                <a:solidFill>
+                  <a:schemeClr val="accent6"/>
+                </a:solidFill>
+              </a:rPr>
+              <a:t> </a:t>
+            </a:r>
+            <a:r>
+              <a:rPr lang="en-US" dirty="0">
+                <a:solidFill>
+                  <a:schemeClr val="accent6"/>
+                </a:solidFill>
+              </a:rPr>
+              <a:t>with </a:t>
+            </a:r>
+            <a:r>
+              <a:rPr lang="en-US" dirty="0" err="1">
+                <a:solidFill>
+                  <a:schemeClr val="accent6"/>
+                </a:solidFill>
+              </a:rPr>
+              <a:t>LinearRegression</a:t>
+            </a:r>
+            <a:endParaRPr lang="en-US" dirty="0">
+              <a:solidFill>
+                <a:schemeClr val="accent6"/>
+              </a:solidFill>
+            </a:endParaRPr>
+          </a:p>
+          <a:p>
+            <a:endParaRPr lang="en-US" dirty="0"/>
+          </a:p>
+        </p:txBody>
+      </p:sp>
     </p:spTree>
     <p:extLst>
       <p:ext uri="{BB962C8B-B14F-4D97-AF65-F5344CB8AC3E}">
@@ -14090,10 +15294,17 @@
   <p:clrMapOvr>
     <a:masterClrMapping/>
   </p:clrMapOvr>
+  <p:timing>
+    <p:tnLst>
+      <p:par>
+        <p:cTn id="1" dur="indefinite" restart="never" nodeType="tmRoot"/>
+      </p:par>
+    </p:tnLst>
+  </p:timing>
 </p:sld>
 </file>
 
-<file path=ppt/slides/slide4.xml><?xml version="1.0" encoding="utf-8"?>
+<file path=ppt/slides/slide6.xml><?xml version="1.0" encoding="utf-8"?>
 <p:sld xmlns:a="http://schemas.openxmlformats.org/drawingml/2006/main" xmlns:r="http://schemas.openxmlformats.org/officeDocument/2006/relationships" xmlns:p="http://schemas.openxmlformats.org/presentationml/2006/main">
   <p:cSld>
     <p:spTree>
@@ -14150,8 +15361,8 @@
         </p:nvSpPr>
         <p:spPr>
           <a:xfrm>
-            <a:off x="5514392" y="1447800"/>
-            <a:ext cx="5831632" cy="4572000"/>
+            <a:off x="933057" y="3292875"/>
+            <a:ext cx="3586941" cy="2406588"/>
           </a:xfrm>
         </p:spPr>
         <p:txBody>
@@ -14161,78 +15372,146 @@
           <a:lstStyle/>
           <a:p>
             <a:r>
-              <a:rPr lang="en-US" dirty="0"/>
+              <a:rPr lang="en-US" sz="1400" dirty="0">
+                <a:solidFill>
+                  <a:schemeClr val="accent6"/>
+                </a:solidFill>
+              </a:rPr>
               <a:t>"</a:t>
             </a:r>
             <a:r>
-              <a:rPr lang="en-US" dirty="0" err="1" smtClean="0"/>
+              <a:rPr lang="en-US" sz="1400" dirty="0" err="1" smtClean="0">
+                <a:solidFill>
+                  <a:schemeClr val="accent6"/>
+                </a:solidFill>
+              </a:rPr>
               <a:t>LinearRegression</a:t>
             </a:r>
             <a:r>
-              <a:rPr lang="en-US" dirty="0" smtClean="0"/>
+              <a:rPr lang="en-US" sz="1400" dirty="0" smtClean="0">
+                <a:solidFill>
+                  <a:schemeClr val="accent6"/>
+                </a:solidFill>
+              </a:rPr>
               <a:t>“</a:t>
             </a:r>
           </a:p>
           <a:p>
             <a:r>
-              <a:rPr lang="en-US" dirty="0" smtClean="0"/>
+              <a:rPr lang="en-US" sz="1400" dirty="0" smtClean="0">
+                <a:solidFill>
+                  <a:schemeClr val="accent6"/>
+                </a:solidFill>
+              </a:rPr>
               <a:t>"</a:t>
             </a:r>
             <a:r>
-              <a:rPr lang="en-US" dirty="0" err="1"/>
+              <a:rPr lang="en-US" sz="1400" dirty="0" err="1">
+                <a:solidFill>
+                  <a:schemeClr val="accent6"/>
+                </a:solidFill>
+              </a:rPr>
               <a:t>RandomForestRegressor</a:t>
             </a:r>
             <a:r>
-              <a:rPr lang="en-US" dirty="0"/>
+              <a:rPr lang="en-US" sz="1400" dirty="0">
+                <a:solidFill>
+                  <a:schemeClr val="accent6"/>
+                </a:solidFill>
+              </a:rPr>
               <a:t>" </a:t>
             </a:r>
           </a:p>
           <a:p>
             <a:r>
-              <a:rPr lang="en-US" dirty="0"/>
+              <a:rPr lang="en-US" sz="1400" dirty="0">
+                <a:solidFill>
+                  <a:schemeClr val="accent6"/>
+                </a:solidFill>
+              </a:rPr>
               <a:t>"</a:t>
             </a:r>
             <a:r>
-              <a:rPr lang="en-US" dirty="0" err="1" smtClean="0"/>
+              <a:rPr lang="en-US" sz="1400" dirty="0" err="1" smtClean="0">
+                <a:solidFill>
+                  <a:schemeClr val="accent6"/>
+                </a:solidFill>
+              </a:rPr>
               <a:t>GradientBoostingRegressor</a:t>
             </a:r>
             <a:r>
-              <a:rPr lang="en-US" dirty="0" smtClean="0"/>
+              <a:rPr lang="en-US" sz="1400" dirty="0" smtClean="0">
+                <a:solidFill>
+                  <a:schemeClr val="accent6"/>
+                </a:solidFill>
+              </a:rPr>
               <a:t>“</a:t>
             </a:r>
           </a:p>
           <a:p>
             <a:r>
-              <a:rPr lang="en-US" dirty="0"/>
+              <a:rPr lang="en-US" sz="1400" dirty="0">
+                <a:solidFill>
+                  <a:schemeClr val="accent6"/>
+                </a:solidFill>
+              </a:rPr>
               <a:t>"</a:t>
             </a:r>
             <a:r>
-              <a:rPr lang="en-US" dirty="0" err="1"/>
+              <a:rPr lang="en-US" sz="1400" dirty="0" err="1">
+                <a:solidFill>
+                  <a:schemeClr val="accent6"/>
+                </a:solidFill>
+              </a:rPr>
               <a:t>BaggingRegressor</a:t>
             </a:r>
             <a:r>
-              <a:rPr lang="en-US" dirty="0"/>
+              <a:rPr lang="en-US" sz="1400" dirty="0">
+                <a:solidFill>
+                  <a:schemeClr val="accent6"/>
+                </a:solidFill>
+              </a:rPr>
               <a:t>", </a:t>
             </a:r>
           </a:p>
           <a:p>
             <a:r>
-              <a:rPr lang="en-US" dirty="0" err="1" smtClean="0"/>
+              <a:rPr lang="en-US" sz="1400" dirty="0" err="1" smtClean="0">
+                <a:solidFill>
+                  <a:schemeClr val="accent6"/>
+                </a:solidFill>
+              </a:rPr>
               <a:t>polynomialFeatures</a:t>
             </a:r>
             <a:r>
-              <a:rPr lang="en-US" dirty="0" smtClean="0"/>
+              <a:rPr lang="en-US" sz="1400" dirty="0" smtClean="0">
+                <a:solidFill>
+                  <a:schemeClr val="accent6"/>
+                </a:solidFill>
+              </a:rPr>
               <a:t> </a:t>
             </a:r>
             <a:r>
-              <a:rPr lang="en-US" dirty="0"/>
+              <a:rPr lang="en-US" sz="1400" dirty="0">
+                <a:solidFill>
+                  <a:schemeClr val="accent6"/>
+                </a:solidFill>
+              </a:rPr>
               <a:t>with </a:t>
             </a:r>
             <a:r>
-              <a:rPr lang="en-US" dirty="0" err="1"/>
+              <a:rPr lang="en-US" sz="1400" dirty="0" err="1">
+                <a:solidFill>
+                  <a:schemeClr val="accent6"/>
+                </a:solidFill>
+              </a:rPr>
               <a:t>LinearRegression</a:t>
             </a:r>
-            <a:endParaRPr lang="en-US" dirty="0"/>
+            <a:endParaRPr lang="en-US" sz="1400" dirty="0">
+              <a:solidFill>
+                <a:schemeClr val="accent6"/>
+              </a:solidFill>
+            </a:endParaRPr>
           </a:p>
         </p:txBody>
       </p:sp>
@@ -14280,14 +15559,14 @@
           <p:nvPr>
             <p:extLst>
               <p:ext uri="{D42A27DB-BD31-4B8C-83A1-F6EECF244321}">
-                <p14:modId xmlns:p14="http://schemas.microsoft.com/office/powerpoint/2010/main" val="3216021381"/>
+                <p14:modId xmlns:p14="http://schemas.microsoft.com/office/powerpoint/2010/main" val="3175581572"/>
               </p:ext>
             </p:extLst>
           </p:nvPr>
         </p:nvGraphicFramePr>
         <p:xfrm>
-          <a:off x="634483" y="3648267"/>
-          <a:ext cx="4058814" cy="1586204"/>
+          <a:off x="5184560" y="1712934"/>
+          <a:ext cx="5823750" cy="3986529"/>
         </p:xfrm>
         <a:graphic>
           <a:graphicData uri="http://schemas.openxmlformats.org/drawingml/2006/table">
@@ -14296,42 +15575,42 @@
                 <a:tableStyleId>{5C22544A-7EE6-4342-B048-85BDC9FD1C3A}</a:tableStyleId>
               </a:tblPr>
               <a:tblGrid>
-                <a:gridCol w="651582">
+                <a:gridCol w="934916">
                   <a:extLst>
                     <a:ext uri="{9D8B030D-6E8A-4147-A177-3AD203B41FA5}">
                       <a16:colId xmlns:a16="http://schemas.microsoft.com/office/drawing/2014/main" val="950921615"/>
                     </a:ext>
                   </a:extLst>
                 </a:gridCol>
-                <a:gridCol w="651582">
+                <a:gridCol w="934916">
                   <a:extLst>
                     <a:ext uri="{9D8B030D-6E8A-4147-A177-3AD203B41FA5}">
                       <a16:colId xmlns:a16="http://schemas.microsoft.com/office/drawing/2014/main" val="541359384"/>
                     </a:ext>
                   </a:extLst>
                 </a:gridCol>
-                <a:gridCol w="800904">
+                <a:gridCol w="1149170">
                   <a:extLst>
                     <a:ext uri="{9D8B030D-6E8A-4147-A177-3AD203B41FA5}">
                       <a16:colId xmlns:a16="http://schemas.microsoft.com/office/drawing/2014/main" val="908271698"/>
                     </a:ext>
                   </a:extLst>
                 </a:gridCol>
-                <a:gridCol w="651582">
+                <a:gridCol w="934916">
                   <a:extLst>
                     <a:ext uri="{9D8B030D-6E8A-4147-A177-3AD203B41FA5}">
                       <a16:colId xmlns:a16="http://schemas.microsoft.com/office/drawing/2014/main" val="338815645"/>
                     </a:ext>
                   </a:extLst>
                 </a:gridCol>
-                <a:gridCol w="651582">
+                <a:gridCol w="934916">
                   <a:extLst>
                     <a:ext uri="{9D8B030D-6E8A-4147-A177-3AD203B41FA5}">
                       <a16:colId xmlns:a16="http://schemas.microsoft.com/office/drawing/2014/main" val="3012572500"/>
                     </a:ext>
                   </a:extLst>
                 </a:gridCol>
-                <a:gridCol w="651582">
+                <a:gridCol w="934916">
                   <a:extLst>
                     <a:ext uri="{9D8B030D-6E8A-4147-A177-3AD203B41FA5}">
                       <a16:colId xmlns:a16="http://schemas.microsoft.com/office/drawing/2014/main" val="3870119456"/>
@@ -14339,13 +15618,13 @@
                   </a:extLst>
                 </a:gridCol>
               </a:tblGrid>
-              <a:tr h="262544">
+              <a:tr h="659839">
                 <a:tc>
                   <a:txBody>
                     <a:bodyPr/>
                     <a:lstStyle/>
                     <a:p>
-                      <a:pPr algn="l" fontAlgn="b"/>
+                      <a:pPr algn="ctr" fontAlgn="b"/>
                       <a:r>
                         <a:rPr lang="en-US" sz="1100" b="1" u="none" strike="noStrike" dirty="0">
                           <a:effectLst/>
@@ -14361,14 +15640,18 @@
                       </a:endParaRPr>
                     </a:p>
                   </a:txBody>
-                  <a:tcPr marL="7620" marR="7620" marT="7620" marB="0" anchor="b"/>
+                  <a:tcPr marL="7620" marR="7620" marT="7620" marB="0" anchor="ctr">
+                    <a:solidFill>
+                      <a:srgbClr val="00B0F0"/>
+                    </a:solidFill>
+                  </a:tcPr>
                 </a:tc>
                 <a:tc>
                   <a:txBody>
                     <a:bodyPr/>
                     <a:lstStyle/>
                     <a:p>
-                      <a:pPr algn="l" fontAlgn="b"/>
+                      <a:pPr algn="ctr" fontAlgn="b"/>
                       <a:r>
                         <a:rPr lang="en-US" sz="1100" b="1" u="none" strike="noStrike" dirty="0">
                           <a:effectLst/>
@@ -14384,14 +15667,18 @@
                       </a:endParaRPr>
                     </a:p>
                   </a:txBody>
-                  <a:tcPr marL="7620" marR="7620" marT="7620" marB="0" anchor="b"/>
+                  <a:tcPr marL="7620" marR="7620" marT="7620" marB="0" anchor="ctr">
+                    <a:solidFill>
+                      <a:srgbClr val="00B0F0"/>
+                    </a:solidFill>
+                  </a:tcPr>
                 </a:tc>
                 <a:tc>
                   <a:txBody>
                     <a:bodyPr/>
                     <a:lstStyle/>
                     <a:p>
-                      <a:pPr algn="l" fontAlgn="b"/>
+                      <a:pPr algn="ctr" fontAlgn="b"/>
                       <a:r>
                         <a:rPr lang="en-US" sz="1100" b="1" u="none" strike="noStrike" dirty="0">
                           <a:effectLst/>
@@ -14407,14 +15694,18 @@
                       </a:endParaRPr>
                     </a:p>
                   </a:txBody>
-                  <a:tcPr marL="7620" marR="7620" marT="7620" marB="0" anchor="b"/>
+                  <a:tcPr marL="7620" marR="7620" marT="7620" marB="0" anchor="ctr">
+                    <a:solidFill>
+                      <a:srgbClr val="00B0F0"/>
+                    </a:solidFill>
+                  </a:tcPr>
                 </a:tc>
                 <a:tc>
                   <a:txBody>
                     <a:bodyPr/>
                     <a:lstStyle/>
                     <a:p>
-                      <a:pPr algn="l" fontAlgn="b"/>
+                      <a:pPr algn="ctr" fontAlgn="b"/>
                       <a:r>
                         <a:rPr lang="en-US" sz="1100" b="1" u="none" strike="noStrike" dirty="0">
                           <a:effectLst/>
@@ -14430,14 +15721,18 @@
                       </a:endParaRPr>
                     </a:p>
                   </a:txBody>
-                  <a:tcPr marL="7620" marR="7620" marT="7620" marB="0" anchor="b"/>
+                  <a:tcPr marL="7620" marR="7620" marT="7620" marB="0" anchor="ctr">
+                    <a:solidFill>
+                      <a:srgbClr val="00B0F0"/>
+                    </a:solidFill>
+                  </a:tcPr>
                 </a:tc>
                 <a:tc>
                   <a:txBody>
                     <a:bodyPr/>
                     <a:lstStyle/>
                     <a:p>
-                      <a:pPr algn="l" fontAlgn="b"/>
+                      <a:pPr algn="ctr" fontAlgn="b"/>
                       <a:r>
                         <a:rPr lang="en-US" sz="1100" b="1" u="none" strike="noStrike" dirty="0">
                           <a:effectLst/>
@@ -14453,14 +15748,18 @@
                       </a:endParaRPr>
                     </a:p>
                   </a:txBody>
-                  <a:tcPr marL="7620" marR="7620" marT="7620" marB="0" anchor="b"/>
+                  <a:tcPr marL="7620" marR="7620" marT="7620" marB="0" anchor="ctr">
+                    <a:solidFill>
+                      <a:srgbClr val="00B0F0"/>
+                    </a:solidFill>
+                  </a:tcPr>
                 </a:tc>
                 <a:tc>
                   <a:txBody>
                     <a:bodyPr/>
                     <a:lstStyle/>
                     <a:p>
-                      <a:pPr algn="l" fontAlgn="b"/>
+                      <a:pPr algn="ctr" fontAlgn="b"/>
                       <a:r>
                         <a:rPr lang="en-US" sz="1100" b="1" u="none" strike="noStrike" dirty="0">
                           <a:effectLst/>
@@ -14476,7 +15775,11 @@
                       </a:endParaRPr>
                     </a:p>
                   </a:txBody>
-                  <a:tcPr marL="7620" marR="7620" marT="7620" marB="0" anchor="b"/>
+                  <a:tcPr marL="7620" marR="7620" marT="7620" marB="0" anchor="ctr">
+                    <a:solidFill>
+                      <a:srgbClr val="00B0F0"/>
+                    </a:solidFill>
+                  </a:tcPr>
                 </a:tc>
                 <a:extLst>
                   <a:ext uri="{0D108BD9-81ED-4DB2-BD59-A6C34878D82A}">
@@ -14484,7 +15787,7 @@
                   </a:ext>
                 </a:extLst>
               </a:tr>
-              <a:tr h="262544">
+              <a:tr h="659839">
                 <a:tc>
                   <a:txBody>
                     <a:bodyPr/>
@@ -14506,7 +15809,11 @@
                       </a:endParaRPr>
                     </a:p>
                   </a:txBody>
-                  <a:tcPr marL="7620" marR="7620" marT="7620" marB="0" anchor="b"/>
+                  <a:tcPr marL="7620" marR="7620" marT="7620" marB="0" anchor="ctr">
+                    <a:solidFill>
+                      <a:srgbClr val="00B0F0"/>
+                    </a:solidFill>
+                  </a:tcPr>
                 </a:tc>
                 <a:tc>
                   <a:txBody>
@@ -14529,7 +15836,7 @@
                       </a:endParaRPr>
                     </a:p>
                   </a:txBody>
-                  <a:tcPr marL="7620" marR="7620" marT="7620" marB="0" anchor="b"/>
+                  <a:tcPr marL="7620" marR="7620" marT="7620" marB="0" anchor="ctr"/>
                 </a:tc>
                 <a:tc>
                   <a:txBody>
@@ -14552,7 +15859,7 @@
                       </a:endParaRPr>
                     </a:p>
                   </a:txBody>
-                  <a:tcPr marL="7620" marR="7620" marT="7620" marB="0" anchor="b"/>
+                  <a:tcPr marL="7620" marR="7620" marT="7620" marB="0" anchor="ctr"/>
                 </a:tc>
                 <a:tc>
                   <a:txBody>
@@ -14575,7 +15882,7 @@
                       </a:endParaRPr>
                     </a:p>
                   </a:txBody>
-                  <a:tcPr marL="7620" marR="7620" marT="7620" marB="0" anchor="b"/>
+                  <a:tcPr marL="7620" marR="7620" marT="7620" marB="0" anchor="ctr"/>
                 </a:tc>
                 <a:tc>
                   <a:txBody>
@@ -14598,7 +15905,7 @@
                       </a:endParaRPr>
                     </a:p>
                   </a:txBody>
-                  <a:tcPr marL="7620" marR="7620" marT="7620" marB="0" anchor="b"/>
+                  <a:tcPr marL="7620" marR="7620" marT="7620" marB="0" anchor="ctr"/>
                 </a:tc>
                 <a:tc>
                   <a:txBody>
@@ -14607,12 +15914,12 @@
                     <a:p>
                       <a:pPr algn="r" fontAlgn="b"/>
                       <a:r>
-                        <a:rPr lang="en-US" sz="1100" u="none" strike="noStrike">
+                        <a:rPr lang="en-US" sz="1100" u="none" strike="noStrike" dirty="0">
                           <a:effectLst/>
                         </a:rPr>
                         <a:t>0.587874</a:t>
                       </a:r>
-                      <a:endParaRPr lang="en-US" sz="1100" b="0" i="0" u="none" strike="noStrike">
+                      <a:endParaRPr lang="en-US" sz="1100" b="0" i="0" u="none" strike="noStrike" dirty="0">
                         <a:solidFill>
                           <a:srgbClr val="000000"/>
                         </a:solidFill>
@@ -14621,7 +15928,7 @@
                       </a:endParaRPr>
                     </a:p>
                   </a:txBody>
-                  <a:tcPr marL="7620" marR="7620" marT="7620" marB="0" anchor="b"/>
+                  <a:tcPr marL="7620" marR="7620" marT="7620" marB="0" anchor="ctr"/>
                 </a:tc>
                 <a:extLst>
                   <a:ext uri="{0D108BD9-81ED-4DB2-BD59-A6C34878D82A}">
@@ -14629,7 +15936,7 @@
                   </a:ext>
                 </a:extLst>
               </a:tr>
-              <a:tr h="262544">
+              <a:tr h="659839">
                 <a:tc>
                   <a:txBody>
                     <a:bodyPr/>
@@ -14651,7 +15958,11 @@
                       </a:endParaRPr>
                     </a:p>
                   </a:txBody>
-                  <a:tcPr marL="7620" marR="7620" marT="7620" marB="0" anchor="b"/>
+                  <a:tcPr marL="7620" marR="7620" marT="7620" marB="0" anchor="ctr">
+                    <a:solidFill>
+                      <a:srgbClr val="00B0F0"/>
+                    </a:solidFill>
+                  </a:tcPr>
                 </a:tc>
                 <a:tc>
                   <a:txBody>
@@ -14674,7 +15985,7 @@
                       </a:endParaRPr>
                     </a:p>
                   </a:txBody>
-                  <a:tcPr marL="7620" marR="7620" marT="7620" marB="0" anchor="b"/>
+                  <a:tcPr marL="7620" marR="7620" marT="7620" marB="0" anchor="ctr"/>
                 </a:tc>
                 <a:tc>
                   <a:txBody>
@@ -14697,7 +16008,7 @@
                       </a:endParaRPr>
                     </a:p>
                   </a:txBody>
-                  <a:tcPr marL="7620" marR="7620" marT="7620" marB="0" anchor="b"/>
+                  <a:tcPr marL="7620" marR="7620" marT="7620" marB="0" anchor="ctr"/>
                 </a:tc>
                 <a:tc>
                   <a:txBody>
@@ -14720,7 +16031,7 @@
                       </a:endParaRPr>
                     </a:p>
                   </a:txBody>
-                  <a:tcPr marL="7620" marR="7620" marT="7620" marB="0" anchor="b"/>
+                  <a:tcPr marL="7620" marR="7620" marT="7620" marB="0" anchor="ctr"/>
                 </a:tc>
                 <a:tc>
                   <a:txBody>
@@ -14743,7 +16054,7 @@
                       </a:endParaRPr>
                     </a:p>
                   </a:txBody>
-                  <a:tcPr marL="7620" marR="7620" marT="7620" marB="0" anchor="b"/>
+                  <a:tcPr marL="7620" marR="7620" marT="7620" marB="0" anchor="ctr"/>
                 </a:tc>
                 <a:tc>
                   <a:txBody>
@@ -14752,12 +16063,12 @@
                     <a:p>
                       <a:pPr algn="r" fontAlgn="b"/>
                       <a:r>
-                        <a:rPr lang="en-US" sz="1100" u="none" strike="noStrike">
+                        <a:rPr lang="en-US" sz="1100" u="none" strike="noStrike" dirty="0">
                           <a:effectLst/>
                         </a:rPr>
                         <a:t>0.815546</a:t>
                       </a:r>
-                      <a:endParaRPr lang="en-US" sz="1100" b="0" i="0" u="none" strike="noStrike">
+                      <a:endParaRPr lang="en-US" sz="1100" b="0" i="0" u="none" strike="noStrike" dirty="0">
                         <a:solidFill>
                           <a:srgbClr val="000000"/>
                         </a:solidFill>
@@ -14766,7 +16077,7 @@
                       </a:endParaRPr>
                     </a:p>
                   </a:txBody>
-                  <a:tcPr marL="7620" marR="7620" marT="7620" marB="0" anchor="b"/>
+                  <a:tcPr marL="7620" marR="7620" marT="7620" marB="0" anchor="ctr"/>
                 </a:tc>
                 <a:extLst>
                   <a:ext uri="{0D108BD9-81ED-4DB2-BD59-A6C34878D82A}">
@@ -14774,7 +16085,7 @@
                   </a:ext>
                 </a:extLst>
               </a:tr>
-              <a:tr h="262544">
+              <a:tr h="659839">
                 <a:tc>
                   <a:txBody>
                     <a:bodyPr/>
@@ -14796,7 +16107,11 @@
                       </a:endParaRPr>
                     </a:p>
                   </a:txBody>
-                  <a:tcPr marL="7620" marR="7620" marT="7620" marB="0" anchor="b"/>
+                  <a:tcPr marL="7620" marR="7620" marT="7620" marB="0" anchor="ctr">
+                    <a:solidFill>
+                      <a:srgbClr val="00B0F0"/>
+                    </a:solidFill>
+                  </a:tcPr>
                 </a:tc>
                 <a:tc>
                   <a:txBody>
@@ -14819,7 +16134,11 @@
                       </a:endParaRPr>
                     </a:p>
                   </a:txBody>
-                  <a:tcPr marL="7620" marR="7620" marT="7620" marB="0" anchor="b"/>
+                  <a:tcPr marL="7620" marR="7620" marT="7620" marB="0" anchor="ctr">
+                    <a:solidFill>
+                      <a:srgbClr val="92D050"/>
+                    </a:solidFill>
+                  </a:tcPr>
                 </a:tc>
                 <a:tc>
                   <a:txBody>
@@ -14842,7 +16161,11 @@
                       </a:endParaRPr>
                     </a:p>
                   </a:txBody>
-                  <a:tcPr marL="7620" marR="7620" marT="7620" marB="0" anchor="b"/>
+                  <a:tcPr marL="7620" marR="7620" marT="7620" marB="0" anchor="ctr">
+                    <a:solidFill>
+                      <a:srgbClr val="92D050"/>
+                    </a:solidFill>
+                  </a:tcPr>
                 </a:tc>
                 <a:tc>
                   <a:txBody>
@@ -14865,7 +16188,11 @@
                       </a:endParaRPr>
                     </a:p>
                   </a:txBody>
-                  <a:tcPr marL="7620" marR="7620" marT="7620" marB="0" anchor="b"/>
+                  <a:tcPr marL="7620" marR="7620" marT="7620" marB="0" anchor="ctr">
+                    <a:solidFill>
+                      <a:srgbClr val="92D050"/>
+                    </a:solidFill>
+                  </a:tcPr>
                 </a:tc>
                 <a:tc>
                   <a:txBody>
@@ -14874,12 +16201,12 @@
                     <a:p>
                       <a:pPr algn="r" fontAlgn="b"/>
                       <a:r>
-                        <a:rPr lang="en-US" sz="1100" u="none" strike="noStrike">
+                        <a:rPr lang="en-US" sz="1100" u="none" strike="noStrike" dirty="0">
                           <a:effectLst/>
                         </a:rPr>
                         <a:t>0.836686</a:t>
                       </a:r>
-                      <a:endParaRPr lang="en-US" sz="1100" b="0" i="0" u="none" strike="noStrike">
+                      <a:endParaRPr lang="en-US" sz="1100" b="0" i="0" u="none" strike="noStrike" dirty="0">
                         <a:solidFill>
                           <a:srgbClr val="000000"/>
                         </a:solidFill>
@@ -14888,7 +16215,11 @@
                       </a:endParaRPr>
                     </a:p>
                   </a:txBody>
-                  <a:tcPr marL="7620" marR="7620" marT="7620" marB="0" anchor="b"/>
+                  <a:tcPr marL="7620" marR="7620" marT="7620" marB="0" anchor="ctr">
+                    <a:solidFill>
+                      <a:srgbClr val="92D050"/>
+                    </a:solidFill>
+                  </a:tcPr>
                 </a:tc>
                 <a:tc>
                   <a:txBody>
@@ -14897,12 +16228,12 @@
                     <a:p>
                       <a:pPr algn="r" fontAlgn="b"/>
                       <a:r>
-                        <a:rPr lang="en-US" sz="1100" u="none" strike="noStrike">
+                        <a:rPr lang="en-US" sz="1100" u="none" strike="noStrike" dirty="0">
                           <a:effectLst/>
                         </a:rPr>
                         <a:t>0.836126</a:t>
                       </a:r>
-                      <a:endParaRPr lang="en-US" sz="1100" b="0" i="0" u="none" strike="noStrike">
+                      <a:endParaRPr lang="en-US" sz="1100" b="0" i="0" u="none" strike="noStrike" dirty="0">
                         <a:solidFill>
                           <a:srgbClr val="000000"/>
                         </a:solidFill>
@@ -14911,7 +16242,11 @@
                       </a:endParaRPr>
                     </a:p>
                   </a:txBody>
-                  <a:tcPr marL="7620" marR="7620" marT="7620" marB="0" anchor="b"/>
+                  <a:tcPr marL="7620" marR="7620" marT="7620" marB="0" anchor="ctr">
+                    <a:solidFill>
+                      <a:srgbClr val="92D050"/>
+                    </a:solidFill>
+                  </a:tcPr>
                 </a:tc>
                 <a:extLst>
                   <a:ext uri="{0D108BD9-81ED-4DB2-BD59-A6C34878D82A}">
@@ -14919,7 +16254,7 @@
                   </a:ext>
                 </a:extLst>
               </a:tr>
-              <a:tr h="262544">
+              <a:tr h="659839">
                 <a:tc>
                   <a:txBody>
                     <a:bodyPr/>
@@ -14941,7 +16276,11 @@
                       </a:endParaRPr>
                     </a:p>
                   </a:txBody>
-                  <a:tcPr marL="7620" marR="7620" marT="7620" marB="0" anchor="b"/>
+                  <a:tcPr marL="7620" marR="7620" marT="7620" marB="0" anchor="ctr">
+                    <a:solidFill>
+                      <a:srgbClr val="00B0F0"/>
+                    </a:solidFill>
+                  </a:tcPr>
                 </a:tc>
                 <a:tc>
                   <a:txBody>
@@ -14964,7 +16303,7 @@
                       </a:endParaRPr>
                     </a:p>
                   </a:txBody>
-                  <a:tcPr marL="7620" marR="7620" marT="7620" marB="0" anchor="b"/>
+                  <a:tcPr marL="7620" marR="7620" marT="7620" marB="0" anchor="ctr"/>
                 </a:tc>
                 <a:tc>
                   <a:txBody>
@@ -14987,7 +16326,7 @@
                       </a:endParaRPr>
                     </a:p>
                   </a:txBody>
-                  <a:tcPr marL="7620" marR="7620" marT="7620" marB="0" anchor="b"/>
+                  <a:tcPr marL="7620" marR="7620" marT="7620" marB="0" anchor="ctr"/>
                 </a:tc>
                 <a:tc>
                   <a:txBody>
@@ -15010,7 +16349,7 @@
                       </a:endParaRPr>
                     </a:p>
                   </a:txBody>
-                  <a:tcPr marL="7620" marR="7620" marT="7620" marB="0" anchor="b"/>
+                  <a:tcPr marL="7620" marR="7620" marT="7620" marB="0" anchor="ctr"/>
                 </a:tc>
                 <a:tc>
                   <a:txBody>
@@ -15033,7 +16372,7 @@
                       </a:endParaRPr>
                     </a:p>
                   </a:txBody>
-                  <a:tcPr marL="7620" marR="7620" marT="7620" marB="0" anchor="b"/>
+                  <a:tcPr marL="7620" marR="7620" marT="7620" marB="0" anchor="ctr"/>
                 </a:tc>
                 <a:tc>
                   <a:txBody>
@@ -15056,7 +16395,7 @@
                       </a:endParaRPr>
                     </a:p>
                   </a:txBody>
-                  <a:tcPr marL="7620" marR="7620" marT="7620" marB="0" anchor="b"/>
+                  <a:tcPr marL="7620" marR="7620" marT="7620" marB="0" anchor="ctr"/>
                 </a:tc>
                 <a:extLst>
                   <a:ext uri="{0D108BD9-81ED-4DB2-BD59-A6C34878D82A}">
@@ -15064,7 +16403,7 @@
                   </a:ext>
                 </a:extLst>
               </a:tr>
-              <a:tr h="273484">
+              <a:tr h="687334">
                 <a:tc>
                   <a:txBody>
                     <a:bodyPr/>
@@ -15086,7 +16425,11 @@
                       </a:endParaRPr>
                     </a:p>
                   </a:txBody>
-                  <a:tcPr marL="7620" marR="7620" marT="7620" marB="0" anchor="b"/>
+                  <a:tcPr marL="7620" marR="7620" marT="7620" marB="0" anchor="ctr">
+                    <a:solidFill>
+                      <a:srgbClr val="00B0F0"/>
+                    </a:solidFill>
+                  </a:tcPr>
                 </a:tc>
                 <a:tc>
                   <a:txBody>
@@ -15110,7 +16453,11 @@
                       </a:endParaRPr>
                     </a:p>
                   </a:txBody>
-                  <a:tcPr marL="7620" marR="7620" marT="7620" marB="0" anchor="ctr"/>
+                  <a:tcPr marL="7620" marR="7620" marT="7620" marB="0" anchor="ctr">
+                    <a:solidFill>
+                      <a:srgbClr val="FFFF00"/>
+                    </a:solidFill>
+                  </a:tcPr>
                 </a:tc>
                 <a:tc>
                   <a:txBody>
@@ -15134,7 +16481,11 @@
                       </a:endParaRPr>
                     </a:p>
                   </a:txBody>
-                  <a:tcPr marL="7620" marR="7620" marT="7620" marB="0" anchor="ctr"/>
+                  <a:tcPr marL="7620" marR="7620" marT="7620" marB="0" anchor="ctr">
+                    <a:solidFill>
+                      <a:srgbClr val="FFFF00"/>
+                    </a:solidFill>
+                  </a:tcPr>
                 </a:tc>
                 <a:tc>
                   <a:txBody>
@@ -15158,7 +16509,11 @@
                       </a:endParaRPr>
                     </a:p>
                   </a:txBody>
-                  <a:tcPr marL="7620" marR="7620" marT="7620" marB="0" anchor="ctr"/>
+                  <a:tcPr marL="7620" marR="7620" marT="7620" marB="0" anchor="ctr">
+                    <a:solidFill>
+                      <a:srgbClr val="FFFF00"/>
+                    </a:solidFill>
+                  </a:tcPr>
                 </a:tc>
                 <a:tc>
                   <a:txBody>
@@ -15167,12 +16522,12 @@
                     <a:p>
                       <a:pPr algn="r" fontAlgn="ctr"/>
                       <a:r>
-                        <a:rPr lang="en-US" sz="1100" u="none" strike="noStrike">
+                        <a:rPr lang="en-US" sz="1100" u="none" strike="noStrike" dirty="0">
                           <a:effectLst/>
                         </a:rPr>
                         <a:t>0.829818</a:t>
                       </a:r>
-                      <a:endParaRPr lang="en-US" sz="1100" b="0" i="0" u="none" strike="noStrike">
+                      <a:endParaRPr lang="en-US" sz="1100" b="0" i="0" u="none" strike="noStrike" dirty="0">
                         <a:solidFill>
                           <a:srgbClr val="000000"/>
                         </a:solidFill>
@@ -15182,7 +16537,11 @@
                       </a:endParaRPr>
                     </a:p>
                   </a:txBody>
-                  <a:tcPr marL="7620" marR="7620" marT="7620" marB="0" anchor="ctr"/>
+                  <a:tcPr marL="7620" marR="7620" marT="7620" marB="0" anchor="ctr">
+                    <a:solidFill>
+                      <a:srgbClr val="FFFF00"/>
+                    </a:solidFill>
+                  </a:tcPr>
                 </a:tc>
                 <a:tc>
                   <a:txBody>
@@ -15206,7 +16565,11 @@
                       </a:endParaRPr>
                     </a:p>
                   </a:txBody>
-                  <a:tcPr marL="7620" marR="7620" marT="7620" marB="0" anchor="ctr"/>
+                  <a:tcPr marL="7620" marR="7620" marT="7620" marB="0" anchor="ctr">
+                    <a:solidFill>
+                      <a:srgbClr val="FFFF00"/>
+                    </a:solidFill>
+                  </a:tcPr>
                 </a:tc>
                 <a:extLst>
                   <a:ext uri="{0D108BD9-81ED-4DB2-BD59-A6C34878D82A}">
@@ -15228,10 +16591,17 @@
   <p:clrMapOvr>
     <a:masterClrMapping/>
   </p:clrMapOvr>
+  <p:timing>
+    <p:tnLst>
+      <p:par>
+        <p:cTn id="1" dur="indefinite" restart="never" nodeType="tmRoot"/>
+      </p:par>
+    </p:tnLst>
+  </p:timing>
 </p:sld>
 </file>
 
-<file path=ppt/slides/slide5.xml><?xml version="1.0" encoding="utf-8"?>
+<file path=ppt/slides/slide7.xml><?xml version="1.0" encoding="utf-8"?>
 <p:sld xmlns:a="http://schemas.openxmlformats.org/drawingml/2006/main" xmlns:r="http://schemas.openxmlformats.org/officeDocument/2006/relationships" xmlns:p="http://schemas.openxmlformats.org/presentationml/2006/main">
   <p:cSld>
     <p:spTree>
@@ -15324,16 +16694,22 @@
         </p:nvSpPr>
         <p:spPr>
           <a:xfrm>
-            <a:off x="933057" y="2705877"/>
-            <a:ext cx="3314409" cy="3313923"/>
+            <a:off x="941934" y="2936698"/>
+            <a:ext cx="3314409" cy="3251038"/>
           </a:xfrm>
         </p:spPr>
         <p:txBody>
-          <a:bodyPr/>
+          <a:bodyPr>
+            <a:normAutofit fontScale="92500" lnSpcReduction="20000"/>
+          </a:bodyPr>
           <a:lstStyle/>
           <a:p>
             <a:r>
-              <a:rPr lang="en-US" dirty="0" smtClean="0"/>
+              <a:rPr lang="en-US" dirty="0" smtClean="0">
+                <a:solidFill>
+                  <a:schemeClr val="accent6"/>
+                </a:solidFill>
+              </a:rPr>
               <a:t>As can be seen</a:t>
             </a:r>
           </a:p>
@@ -15342,7 +16718,11 @@
               <a:buAutoNum type="arabicPeriod"/>
             </a:pPr>
             <a:r>
-              <a:rPr lang="en-US" dirty="0" smtClean="0"/>
+              <a:rPr lang="en-US" dirty="0" smtClean="0">
+                <a:solidFill>
+                  <a:schemeClr val="accent6"/>
+                </a:solidFill>
+              </a:rPr>
               <a:t>Most predictions are clustered around 45 deg. Line which means Predicted values are close to actual.</a:t>
             </a:r>
           </a:p>
@@ -15351,7 +16731,11 @@
               <a:buAutoNum type="arabicPeriod"/>
             </a:pPr>
             <a:r>
-              <a:rPr lang="en-US" dirty="0" smtClean="0"/>
+              <a:rPr lang="en-US" dirty="0" smtClean="0">
+                <a:solidFill>
+                  <a:schemeClr val="accent6"/>
+                </a:solidFill>
+              </a:rPr>
               <a:t>Some predictions are scattered for higher prices due to</a:t>
             </a:r>
           </a:p>
@@ -15362,10 +16746,7 @@
             <a:r>
               <a:rPr lang="en-US" dirty="0" smtClean="0">
                 <a:solidFill>
-                  <a:schemeClr val="accent6">
-                    <a:lumMod val="60000"/>
-                    <a:lumOff val="40000"/>
-                  </a:schemeClr>
+                  <a:schemeClr val="accent6"/>
                 </a:solidFill>
               </a:rPr>
               <a:t>Fewer observations in the original dataset.</a:t>
@@ -15378,14 +16759,63 @@
             <a:r>
               <a:rPr lang="en-US" dirty="0" smtClean="0">
                 <a:solidFill>
-                  <a:schemeClr val="accent6">
-                    <a:lumMod val="60000"/>
-                    <a:lumOff val="40000"/>
-                  </a:schemeClr>
+                  <a:schemeClr val="accent6"/>
                 </a:solidFill>
               </a:rPr>
-              <a:t>Outliers in the extremely high priced cars.</a:t>
-            </a:r>
+              <a:t>Outliers in the extremely high priced cars</a:t>
+            </a:r>
+            <a:r>
+              <a:rPr lang="en-US" dirty="0" smtClean="0">
+                <a:solidFill>
+                  <a:schemeClr val="accent6"/>
+                </a:solidFill>
+              </a:rPr>
+              <a:t>.</a:t>
+            </a:r>
+          </a:p>
+          <a:p>
+            <a:pPr marL="342900" indent="-342900">
+              <a:buAutoNum type="arabicPeriod"/>
+            </a:pPr>
+            <a:r>
+              <a:rPr lang="en-US" dirty="0" smtClean="0">
+                <a:solidFill>
+                  <a:schemeClr val="accent6"/>
+                </a:solidFill>
+              </a:rPr>
+              <a:t>Post Optimization</a:t>
+            </a:r>
+          </a:p>
+          <a:p>
+            <a:pPr marL="800100" lvl="1" indent="-342900">
+              <a:buAutoNum type="arabicPeriod"/>
+            </a:pPr>
+            <a:r>
+              <a:rPr lang="en-US" dirty="0">
+                <a:solidFill>
+                  <a:schemeClr val="accent6"/>
+                </a:solidFill>
+              </a:rPr>
+              <a:t>RMSE : 5721.934082264436</a:t>
+            </a:r>
+          </a:p>
+          <a:p>
+            <a:pPr marL="800100" lvl="1" indent="-342900">
+              <a:buAutoNum type="arabicPeriod"/>
+            </a:pPr>
+            <a:r>
+              <a:rPr lang="en-US" dirty="0">
+                <a:solidFill>
+                  <a:schemeClr val="accent6"/>
+                </a:solidFill>
+              </a:rPr>
+              <a:t>R2 : 0.8458494048274824</a:t>
+            </a:r>
+            <a:endParaRPr lang="en-US" dirty="0" smtClean="0">
+              <a:solidFill>
+                <a:schemeClr val="accent6"/>
+              </a:solidFill>
+            </a:endParaRPr>
           </a:p>
         </p:txBody>
       </p:sp>
@@ -15399,10 +16829,17 @@
   <p:clrMapOvr>
     <a:masterClrMapping/>
   </p:clrMapOvr>
+  <p:timing>
+    <p:tnLst>
+      <p:par>
+        <p:cTn id="1" dur="indefinite" restart="never" nodeType="tmRoot"/>
+      </p:par>
+    </p:tnLst>
+  </p:timing>
 </p:sld>
 </file>
 
-<file path=ppt/slides/slide6.xml><?xml version="1.0" encoding="utf-8"?>
+<file path=ppt/slides/slide8.xml><?xml version="1.0" encoding="utf-8"?>
 <p:sld xmlns:a="http://schemas.openxmlformats.org/drawingml/2006/main" xmlns:r="http://schemas.openxmlformats.org/officeDocument/2006/relationships" xmlns:p="http://schemas.openxmlformats.org/presentationml/2006/main">
   <p:cSld>
     <p:spTree>
@@ -15431,7 +16868,7 @@
         </p:nvSpPr>
         <p:spPr>
           <a:xfrm>
-            <a:off x="1014995" y="503853"/>
+            <a:off x="1023872" y="672528"/>
             <a:ext cx="2793158" cy="2267339"/>
           </a:xfrm>
         </p:spPr>
@@ -15466,16 +16903,22 @@
         </p:nvSpPr>
         <p:spPr>
           <a:xfrm>
-            <a:off x="933057" y="2705877"/>
-            <a:ext cx="3314409" cy="3313923"/>
+            <a:off x="933057" y="3222594"/>
+            <a:ext cx="3314409" cy="2911876"/>
           </a:xfrm>
         </p:spPr>
         <p:txBody>
-          <a:bodyPr/>
+          <a:bodyPr>
+            <a:normAutofit fontScale="92500" lnSpcReduction="20000"/>
+          </a:bodyPr>
           <a:lstStyle/>
           <a:p>
             <a:r>
-              <a:rPr lang="en-US" dirty="0" smtClean="0"/>
+              <a:rPr lang="en-US" dirty="0" smtClean="0">
+                <a:solidFill>
+                  <a:schemeClr val="accent6"/>
+                </a:solidFill>
+              </a:rPr>
               <a:t>As can be seen</a:t>
             </a:r>
           </a:p>
@@ -15484,7 +16927,11 @@
               <a:buAutoNum type="arabicPeriod"/>
             </a:pPr>
             <a:r>
-              <a:rPr lang="en-US" dirty="0" smtClean="0"/>
+              <a:rPr lang="en-US" dirty="0" smtClean="0">
+                <a:solidFill>
+                  <a:schemeClr val="accent6"/>
+                </a:solidFill>
+              </a:rPr>
               <a:t>Predictions are very similar to the ones in GBR</a:t>
             </a:r>
           </a:p>
@@ -15493,7 +16940,11 @@
               <a:buAutoNum type="arabicPeriod"/>
             </a:pPr>
             <a:r>
-              <a:rPr lang="en-US" dirty="0" smtClean="0"/>
+              <a:rPr lang="en-US" dirty="0" smtClean="0">
+                <a:solidFill>
+                  <a:schemeClr val="accent6"/>
+                </a:solidFill>
+              </a:rPr>
               <a:t>Similar observations for higher prices due to</a:t>
             </a:r>
           </a:p>
@@ -15504,10 +16955,7 @@
             <a:r>
               <a:rPr lang="en-US" dirty="0" smtClean="0">
                 <a:solidFill>
-                  <a:schemeClr val="accent6">
-                    <a:lumMod val="60000"/>
-                    <a:lumOff val="40000"/>
-                  </a:schemeClr>
+                  <a:schemeClr val="accent6"/>
                 </a:solidFill>
               </a:rPr>
               <a:t>Fewer observations in the original dataset.</a:t>
@@ -15520,25 +16968,69 @@
             <a:r>
               <a:rPr lang="en-US" dirty="0" smtClean="0">
                 <a:solidFill>
-                  <a:schemeClr val="accent6">
-                    <a:lumMod val="60000"/>
-                    <a:lumOff val="40000"/>
-                  </a:schemeClr>
+                  <a:schemeClr val="accent6"/>
                 </a:solidFill>
               </a:rPr>
-              <a:t>Outliers in the extremely high priced cars.</a:t>
+              <a:t>Outliers in the extremely high priced cars</a:t>
+            </a:r>
+            <a:r>
+              <a:rPr lang="en-US" dirty="0" smtClean="0">
+                <a:solidFill>
+                  <a:schemeClr val="accent6"/>
+                </a:solidFill>
+              </a:rPr>
+              <a:t>.</a:t>
+            </a:r>
+          </a:p>
+          <a:p>
+            <a:pPr marL="342900" indent="-342900">
+              <a:buAutoNum type="arabicPeriod"/>
+            </a:pPr>
+            <a:r>
+              <a:rPr lang="en-US" dirty="0" smtClean="0">
+                <a:solidFill>
+                  <a:schemeClr val="accent6"/>
+                </a:solidFill>
+              </a:rPr>
+              <a:t>Post Optimizations</a:t>
             </a:r>
           </a:p>
           <a:p>
             <a:pPr marL="800100" lvl="1" indent="-342900">
               <a:buAutoNum type="arabicPeriod"/>
             </a:pPr>
+            <a:r>
+              <a:rPr lang="en-US" dirty="0" smtClean="0">
+                <a:solidFill>
+                  <a:schemeClr val="accent6"/>
+                </a:solidFill>
+              </a:rPr>
+              <a:t>RMSE : 6012.105230147659</a:t>
+            </a:r>
+          </a:p>
+          <a:p>
+            <a:pPr marL="800100" lvl="1" indent="-342900">
+              <a:buAutoNum type="arabicPeriod"/>
+            </a:pPr>
+            <a:r>
+              <a:rPr lang="en-US" dirty="0" smtClean="0">
+                <a:solidFill>
+                  <a:schemeClr val="accent6"/>
+                </a:solidFill>
+              </a:rPr>
+              <a:t>R2 </a:t>
+            </a:r>
+            <a:r>
+              <a:rPr lang="en-US" dirty="0">
+                <a:solidFill>
+                  <a:schemeClr val="accent6"/>
+                </a:solidFill>
+              </a:rPr>
+              <a:t>: 0.829818380549723</a:t>
+            </a:r>
             <a:endParaRPr lang="en-US" dirty="0" smtClean="0">
               <a:solidFill>
-                <a:schemeClr val="accent6">
-                  <a:lumMod val="60000"/>
-                  <a:lumOff val="40000"/>
-                </a:schemeClr>
+                <a:schemeClr val="accent6"/>
               </a:solidFill>
             </a:endParaRPr>
           </a:p>
@@ -15583,10 +17075,17 @@
   <p:clrMapOvr>
     <a:masterClrMapping/>
   </p:clrMapOvr>
+  <p:timing>
+    <p:tnLst>
+      <p:par>
+        <p:cTn id="1" dur="indefinite" restart="never" nodeType="tmRoot"/>
+      </p:par>
+    </p:tnLst>
+  </p:timing>
 </p:sld>
 </file>
 
-<file path=ppt/slides/slide7.xml><?xml version="1.0" encoding="utf-8"?>
+<file path=ppt/slides/slide9.xml><?xml version="1.0" encoding="utf-8"?>
 <p:sld xmlns:a="http://schemas.openxmlformats.org/drawingml/2006/main" xmlns:r="http://schemas.openxmlformats.org/officeDocument/2006/relationships" xmlns:p="http://schemas.openxmlformats.org/presentationml/2006/main">
   <p:cSld>
     <p:spTree>
@@ -15665,8 +17164,21 @@
             </a:r>
             <a:r>
               <a:rPr lang="en-US" dirty="0" smtClean="0"/>
-              <a:t> – DBR</a:t>
-            </a:r>
+              <a:t> – </a:t>
+            </a:r>
+            <a:r>
+              <a:rPr lang="en-US" dirty="0" err="1">
+                <a:solidFill>
+                  <a:schemeClr val="accent6"/>
+                </a:solidFill>
+              </a:rPr>
+              <a:t>GradientBoostingRegressor</a:t>
+            </a:r>
+            <a:endParaRPr lang="en-US" dirty="0" smtClean="0">
+              <a:solidFill>
+                <a:schemeClr val="accent6"/>
+              </a:solidFill>
+            </a:endParaRPr>
           </a:p>
           <a:p>
             <a:r>
@@ -15679,12 +17191,24 @@
             </a:r>
             <a:r>
               <a:rPr lang="en-US" dirty="0" smtClean="0"/>
-              <a:t> - Polynomial</a:t>
-            </a:r>
-          </a:p>
-          <a:p>
-            <a:r>
-              <a:rPr lang="en-US" dirty="0" smtClean="0"/>
+              <a:t> - </a:t>
+            </a:r>
+            <a:r>
+              <a:rPr lang="en-US" dirty="0" smtClean="0">
+                <a:solidFill>
+                  <a:schemeClr val="accent6"/>
+                </a:solidFill>
+              </a:rPr>
+              <a:t>Polynomial</a:t>
+            </a:r>
+          </a:p>
+          <a:p>
+            <a:r>
+              <a:rPr lang="en-US" b="1" u="sng" dirty="0" smtClean="0">
+                <a:solidFill>
+                  <a:schemeClr val="accent6"/>
+                </a:solidFill>
+              </a:rPr>
               <a:t>Observations</a:t>
             </a:r>
           </a:p>
@@ -15693,7 +17217,11 @@
               <a:buAutoNum type="arabicPeriod"/>
             </a:pPr>
             <a:r>
-              <a:rPr lang="en-US" dirty="0" smtClean="0"/>
+              <a:rPr lang="en-US" dirty="0" smtClean="0">
+                <a:solidFill>
+                  <a:schemeClr val="accent6"/>
+                </a:solidFill>
+              </a:rPr>
               <a:t>Polynomial results are better at lower prices though it has more negative price predictions.</a:t>
             </a:r>
           </a:p>
@@ -15704,10 +17232,7 @@
             <a:r>
               <a:rPr lang="en-US" dirty="0" smtClean="0">
                 <a:solidFill>
-                  <a:schemeClr val="accent6">
-                    <a:lumMod val="60000"/>
-                    <a:lumOff val="40000"/>
-                  </a:schemeClr>
+                  <a:schemeClr val="accent6"/>
                 </a:solidFill>
               </a:rPr>
               <a:t>GBR on the Contrary has lesser negative price predictions and are better at extremely high prices</a:t>
@@ -15754,217 +17279,13 @@
   <p:clrMapOvr>
     <a:masterClrMapping/>
   </p:clrMapOvr>
-</p:sld>
-</file>
-
-<file path=ppt/slides/slide8.xml><?xml version="1.0" encoding="utf-8"?>
-<p:sld xmlns:a="http://schemas.openxmlformats.org/drawingml/2006/main" xmlns:r="http://schemas.openxmlformats.org/officeDocument/2006/relationships" xmlns:p="http://schemas.openxmlformats.org/presentationml/2006/main">
-  <p:cSld>
-    <p:spTree>
-      <p:nvGrpSpPr>
-        <p:cNvPr id="1" name=""/>
-        <p:cNvGrpSpPr/>
-        <p:nvPr/>
-      </p:nvGrpSpPr>
-      <p:grpSpPr>
-        <a:xfrm>
-          <a:off x="0" y="0"/>
-          <a:ext cx="0" cy="0"/>
-          <a:chOff x="0" y="0"/>
-          <a:chExt cx="0" cy="0"/>
-        </a:xfrm>
-      </p:grpSpPr>
-      <p:sp>
-        <p:nvSpPr>
-          <p:cNvPr id="2" name="Title 1"/>
-          <p:cNvSpPr>
-            <a:spLocks noGrp="1"/>
-          </p:cNvSpPr>
-          <p:nvPr>
-            <p:ph type="title"/>
-          </p:nvPr>
-        </p:nvSpPr>
-        <p:spPr/>
-        <p:txBody>
-          <a:bodyPr/>
-          <a:lstStyle/>
-          <a:p>
-            <a:r>
-              <a:rPr lang="en-US" dirty="0" smtClean="0"/>
-              <a:t>Conclusion</a:t>
-            </a:r>
-            <a:endParaRPr lang="en-US" dirty="0"/>
-          </a:p>
-        </p:txBody>
-      </p:sp>
-      <p:sp>
-        <p:nvSpPr>
-          <p:cNvPr id="3" name="Content Placeholder 2"/>
-          <p:cNvSpPr>
-            <a:spLocks noGrp="1"/>
-          </p:cNvSpPr>
-          <p:nvPr>
-            <p:ph idx="1"/>
-          </p:nvPr>
-        </p:nvSpPr>
-        <p:spPr>
-          <a:xfrm>
-            <a:off x="447869" y="2286000"/>
-            <a:ext cx="11252719" cy="4422710"/>
-          </a:xfrm>
-        </p:spPr>
-        <p:txBody>
-          <a:bodyPr>
-            <a:normAutofit lnSpcReduction="10000"/>
-          </a:bodyPr>
-          <a:lstStyle/>
-          <a:p>
-            <a:r>
-              <a:rPr lang="en-US" dirty="0" smtClean="0"/>
-              <a:t>Based on evaluated Models</a:t>
-            </a:r>
-          </a:p>
-          <a:p>
-            <a:pPr lvl="1"/>
-            <a:r>
-              <a:rPr lang="en-US" dirty="0" smtClean="0"/>
-              <a:t>One option is to use dual model approach </a:t>
-            </a:r>
-          </a:p>
-          <a:p>
-            <a:pPr lvl="2"/>
-            <a:r>
-              <a:rPr lang="en-US" dirty="0" smtClean="0"/>
-              <a:t>For lower priced cars we can use the Polynomial Regression Model for prediction.</a:t>
-            </a:r>
-          </a:p>
-          <a:p>
-            <a:pPr lvl="2"/>
-            <a:r>
-              <a:rPr lang="en-US" dirty="0" smtClean="0"/>
-              <a:t>For High and Extremely high priced cars use </a:t>
-            </a:r>
-            <a:r>
-              <a:rPr lang="en-US" dirty="0" err="1"/>
-              <a:t>GradientBoostingRegressor</a:t>
-            </a:r>
-            <a:r>
-              <a:rPr lang="en-US" dirty="0" smtClean="0"/>
-              <a:t> for prediction.</a:t>
-            </a:r>
-          </a:p>
-          <a:p>
-            <a:pPr lvl="1"/>
-            <a:r>
-              <a:rPr lang="en-US" dirty="0" smtClean="0"/>
-              <a:t>Other option is single model approach.</a:t>
-            </a:r>
-          </a:p>
-          <a:p>
-            <a:pPr lvl="2"/>
-            <a:r>
-              <a:rPr lang="en-US" dirty="0" smtClean="0"/>
-              <a:t>Over all Polynomial is less complex model compared to </a:t>
-            </a:r>
-            <a:r>
-              <a:rPr lang="en-US" dirty="0" err="1" smtClean="0"/>
-              <a:t>GradientBoostingRegressor</a:t>
-            </a:r>
-            <a:endParaRPr lang="en-US" dirty="0" smtClean="0"/>
-          </a:p>
-          <a:p>
-            <a:pPr lvl="2"/>
-            <a:r>
-              <a:rPr lang="en-US" dirty="0" smtClean="0"/>
-              <a:t>Would be simpler to explain, </a:t>
-            </a:r>
-          </a:p>
-          <a:p>
-            <a:pPr lvl="2"/>
-            <a:r>
-              <a:rPr lang="en-US" dirty="0" smtClean="0"/>
-              <a:t>Has comparable results to the </a:t>
-            </a:r>
-            <a:r>
-              <a:rPr lang="en-US" dirty="0" err="1" smtClean="0"/>
-              <a:t>GradientBoostingRegressor</a:t>
-            </a:r>
-            <a:r>
-              <a:rPr lang="en-US" dirty="0"/>
-              <a:t> </a:t>
-            </a:r>
-            <a:r>
-              <a:rPr lang="en-US" dirty="0" smtClean="0"/>
-              <a:t>thus we could use Polynomial for single model approach.</a:t>
-            </a:r>
-          </a:p>
-          <a:p>
-            <a:pPr lvl="1"/>
-            <a:r>
-              <a:rPr lang="en-US" dirty="0" smtClean="0"/>
-              <a:t>As the RMSE is in the range of 6000 we should provide the prediction price range accordingly though most higher variance is for highly priced car category.</a:t>
-            </a:r>
-          </a:p>
-          <a:p>
-            <a:pPr lvl="2"/>
-            <a:r>
-              <a:rPr lang="en-US" dirty="0" smtClean="0"/>
-              <a:t>Range for price &lt; 10k </a:t>
-            </a:r>
-            <a:r>
-              <a:rPr lang="en-US" dirty="0" smtClean="0">
-                <a:sym typeface="Wingdings" panose="05000000000000000000" pitchFamily="2" charset="2"/>
-              </a:rPr>
-              <a:t> ± 1000</a:t>
-            </a:r>
-          </a:p>
-          <a:p>
-            <a:pPr lvl="2"/>
-            <a:r>
-              <a:rPr lang="en-US" dirty="0" smtClean="0">
-                <a:sym typeface="Wingdings" panose="05000000000000000000" pitchFamily="2" charset="2"/>
-              </a:rPr>
-              <a:t>Range for price between 10K and 50K  </a:t>
-            </a:r>
-            <a:r>
-              <a:rPr lang="en-US" dirty="0">
-                <a:sym typeface="Wingdings" panose="05000000000000000000" pitchFamily="2" charset="2"/>
-              </a:rPr>
-              <a:t>± </a:t>
-            </a:r>
-            <a:r>
-              <a:rPr lang="en-US" dirty="0" smtClean="0">
-                <a:sym typeface="Wingdings" panose="05000000000000000000" pitchFamily="2" charset="2"/>
-              </a:rPr>
-              <a:t>4000</a:t>
-            </a:r>
-          </a:p>
-          <a:p>
-            <a:pPr lvl="2"/>
-            <a:r>
-              <a:rPr lang="en-US" dirty="0" smtClean="0">
-                <a:sym typeface="Wingdings" panose="05000000000000000000" pitchFamily="2" charset="2"/>
-              </a:rPr>
-              <a:t>Range for price &gt; 50K  ± 6000</a:t>
-            </a:r>
-            <a:endParaRPr lang="en-US" dirty="0" smtClean="0"/>
-          </a:p>
-          <a:p>
-            <a:pPr lvl="1"/>
-            <a:endParaRPr lang="en-US" dirty="0"/>
-          </a:p>
-        </p:txBody>
-      </p:sp>
-    </p:spTree>
-    <p:extLst>
-      <p:ext uri="{BB962C8B-B14F-4D97-AF65-F5344CB8AC3E}">
-        <p14:creationId xmlns:p14="http://schemas.microsoft.com/office/powerpoint/2010/main" val="1208527875"/>
-      </p:ext>
-    </p:extLst>
-  </p:cSld>
-  <p:clrMapOvr>
-    <a:masterClrMapping/>
-  </p:clrMapOvr>
+  <p:timing>
+    <p:tnLst>
+      <p:par>
+        <p:cTn id="1" dur="indefinite" restart="never" nodeType="tmRoot"/>
+      </p:par>
+    </p:tnLst>
+  </p:timing>
 </p:sld>
 </file>
 

</xml_diff>